<commit_message>
Apply Photon RPC Chat
- Delete unnecessary resource data

- Additional explanation and
  supplementation of PPT material

- Organize and change folder names
</commit_message>
<xml_diff>
--- a/Assets/PPT Data/2022.2.7/How to use it.pptx
+++ b/Assets/PPT Data/2022.2.7/How to use it.pptx
@@ -2,22 +2,20 @@
 <file path=ppt/presentation.xml><?xml version="1.0" encoding="utf-8"?>
 <p:presentation xmlns:a="http://schemas.openxmlformats.org/drawingml/2006/main" xmlns:r="http://schemas.openxmlformats.org/officeDocument/2006/relationships" xmlns:p="http://schemas.openxmlformats.org/presentationml/2006/main" xmlns:p14="http://schemas.microsoft.com/office/powerpoint/2010/main" saveSubsetFonts="1" firstSlideNum="0">
   <p:sldMasterIdLst>
-    <p:sldMasterId id="2147485126" r:id="rId13"/>
+    <p:sldMasterId id="2147485127" r:id="rId13"/>
   </p:sldMasterIdLst>
   <p:notesMasterIdLst>
     <p:notesMasterId r:id="rId15"/>
   </p:notesMasterIdLst>
   <p:sldIdLst>
     <p:sldId id="276" r:id="rId17"/>
-    <p:sldId id="280" r:id="rId19"/>
-    <p:sldId id="278" r:id="rId21"/>
-    <p:sldId id="283" r:id="rId23"/>
-    <p:sldId id="281" r:id="rId25"/>
-    <p:sldId id="284" r:id="rId27"/>
-    <p:sldId id="285" r:id="rId29"/>
-    <p:sldId id="286" r:id="rId30"/>
-    <p:sldId id="287" r:id="rId32"/>
-    <p:sldId id="288" r:id="rId34"/>
+    <p:sldId id="278" r:id="rId19"/>
+    <p:sldId id="283" r:id="rId21"/>
+    <p:sldId id="281" r:id="rId23"/>
+    <p:sldId id="284" r:id="rId25"/>
+    <p:sldId id="285" r:id="rId27"/>
+    <p:sldId id="287" r:id="rId29"/>
+    <p:sldId id="288" r:id="rId31"/>
   </p:sldIdLst>
   <p:sldSz cx="12192000" cy="6858000"/>
   <p:notesSz cx="6858000" cy="9144000"/>
@@ -618,148 +616,6 @@
 </p:notes>
 </file>
 
-<file path=ppt/notesSlides/notesSlide10.xml><?xml version="1.0" encoding="utf-8"?>
-<p:notes xmlns:a="http://schemas.openxmlformats.org/drawingml/2006/main" xmlns:r="http://schemas.openxmlformats.org/officeDocument/2006/relationships" xmlns:p="http://schemas.openxmlformats.org/presentationml/2006/main">
-  <p:cSld>
-    <p:spTree>
-      <p:nvGrpSpPr>
-        <p:cNvPr id="1" name=""/>
-        <p:cNvGrpSpPr/>
-        <p:nvPr/>
-      </p:nvGrpSpPr>
-      <p:grpSpPr>
-        <a:xfrm>
-          <a:off x="0" y="0"/>
-          <a:ext cx="0" cy="0"/>
-          <a:chOff x="0" y="0"/>
-          <a:chExt cx="0" cy="0"/>
-        </a:xfrm>
-      </p:grpSpPr>
-      <p:sp>
-        <p:nvSpPr>
-          <p:cNvPr id="2" name="슬라이드 이미지 개체 틀 3"/>
-          <p:cNvSpPr>
-            <a:spLocks noChangeAspect="1"/>
-          </p:cNvSpPr>
-          <p:nvPr>
-            <p:ph type="sldImg" idx="2"/>
-          </p:nvPr>
-        </p:nvSpPr>
-        <p:spPr>
-          <a:xfrm rot="0">
-            <a:off x="685800" y="1143000"/>
-            <a:ext cx="5494655" cy="3094355"/>
-          </a:xfrm>
-          <a:prstGeom prst="rect"/>
-          <a:noFill/>
-          <a:ln w="12700" cap="flat" cmpd="sng">
-            <a:solidFill>
-              <a:srgbClr val="000000">
-                <a:alpha val="100000"/>
-              </a:srgbClr>
-            </a:solidFill>
-            <a:prstDash val="solid"/>
-          </a:ln>
-        </p:spPr>
-        <p:txBody>
-          <a:bodyPr wrap="square" lIns="91440" tIns="45720" rIns="91440" bIns="45720" numCol="1" vert="horz" anchor="ctr">
-            <a:noAutofit/>
-          </a:bodyPr>
-          <a:lstStyle/>
-          <a:p>
-            <a:pPr marL="0" indent="0" latinLnBrk="0">
-              <a:buFontTx/>
-              <a:buNone/>
-            </a:pPr>
-          </a:p>
-        </p:txBody>
-      </p:sp>
-      <p:sp>
-        <p:nvSpPr>
-          <p:cNvPr id="3" name="슬라이드 노트 개체 틀 4"/>
-          <p:cNvSpPr txBox="1">
-            <a:spLocks/>
-          </p:cNvSpPr>
-          <p:nvPr>
-            <p:ph type="body" idx="3"/>
-          </p:nvPr>
-        </p:nvSpPr>
-        <p:spPr>
-          <a:xfrm rot="0">
-            <a:off x="685800" y="4400550"/>
-            <a:ext cx="5494655" cy="3608705"/>
-          </a:xfrm>
-          <a:prstGeom prst="rect"/>
-        </p:spPr>
-        <p:txBody>
-          <a:bodyPr wrap="square" lIns="91440" tIns="45720" rIns="91440" bIns="45720" numCol="1" vert="horz" anchor="t">
-            <a:noAutofit/>
-          </a:bodyPr>
-          <a:lstStyle/>
-          <a:p>
-            <a:pPr marL="0" indent="0" latinLnBrk="0">
-              <a:buFontTx/>
-              <a:buNone/>
-            </a:pPr>
-          </a:p>
-        </p:txBody>
-      </p:sp>
-      <p:sp>
-        <p:nvSpPr>
-          <p:cNvPr id="4" name="슬라이드 번호 개체 틀 6"/>
-          <p:cNvSpPr txBox="1">
-            <a:spLocks/>
-          </p:cNvSpPr>
-          <p:nvPr>
-            <p:ph type="sldNum" idx="5"/>
-          </p:nvPr>
-        </p:nvSpPr>
-        <p:spPr>
-          <a:xfrm rot="0">
-            <a:off x="3884930" y="8685530"/>
-            <a:ext cx="2980055" cy="466725"/>
-          </a:xfrm>
-          <a:prstGeom prst="rect"/>
-        </p:spPr>
-        <p:txBody>
-          <a:bodyPr wrap="square" lIns="91440" tIns="45720" rIns="91440" bIns="45720" numCol="1" vert="horz" anchor="b">
-            <a:noAutofit/>
-          </a:bodyPr>
-          <a:lstStyle>
-            <a:lvl1pPr marL="0" indent="0" algn="r" latinLnBrk="0">
-              <a:buFontTx/>
-              <a:buNone/>
-              <a:defRPr lang="en-GB" altLang="en-US" sz="1200"/>
-            </a:lvl1pPr>
-          </a:lstStyle>
-          <a:p>
-            <a:pPr marL="0" indent="0" latinLnBrk="0">
-              <a:buFontTx/>
-              <a:buNone/>
-            </a:pPr>
-            <a:fld id="{B9320F77-B9A0-41C5-862A-B4B631284C64}" type="slidenum">
-              <a:rPr lang="ko-KR" altLang="en-US"/>
-              <a:t>‹#›</a:t>
-            </a:fld>
-          </a:p>
-        </p:txBody>
-      </p:sp>
-    </p:spTree>
-  </p:cSld>
-  <p:clrMapOvr>
-    <a:masterClrMapping/>
-  </p:clrMapOvr>
-  <mc:AlternateContent xmlns:mc="http://schemas.openxmlformats.org/markup-compatibility/2006">
-    <mc:Choice xmlns:p14="http://schemas.microsoft.com/office/powerpoint/2010/main" Requires="p14">
-      <p:transition spd="slow" p14:dur="0"/>
-    </mc:Choice>
-    <mc:Fallback>
-      <p:transition spd="slow"/>
-    </mc:Fallback>
-  </mc:AlternateContent>
-</p:notes>
-</file>
-
 <file path=ppt/notesSlides/notesSlide2.xml><?xml version="1.0" encoding="utf-8"?>
 <p:notes xmlns:a="http://schemas.openxmlformats.org/drawingml/2006/main" xmlns:r="http://schemas.openxmlformats.org/officeDocument/2006/relationships" xmlns:p="http://schemas.openxmlformats.org/presentationml/2006/main">
   <p:cSld>
@@ -790,7 +646,7 @@
         <p:spPr>
           <a:xfrm rot="0">
             <a:off x="685800" y="1143000"/>
-            <a:ext cx="5488940" cy="3088640"/>
+            <a:ext cx="5491480" cy="3091180"/>
           </a:xfrm>
           <a:prstGeom prst="rect"/>
           <a:noFill/>
@@ -829,7 +685,7 @@
         <p:spPr>
           <a:xfrm rot="0">
             <a:off x="685800" y="4400550"/>
-            <a:ext cx="5488940" cy="3602990"/>
+            <a:ext cx="5491480" cy="3605530"/>
           </a:xfrm>
           <a:prstGeom prst="rect"/>
         </p:spPr>
@@ -859,7 +715,7 @@
         <p:spPr>
           <a:xfrm rot="0">
             <a:off x="3884930" y="8685530"/>
-            <a:ext cx="2974340" cy="461010"/>
+            <a:ext cx="2976880" cy="463550"/>
           </a:xfrm>
           <a:prstGeom prst="rect"/>
         </p:spPr>
@@ -932,7 +788,7 @@
         <p:spPr>
           <a:xfrm rot="0">
             <a:off x="685800" y="1143000"/>
-            <a:ext cx="5491480" cy="3091180"/>
+            <a:ext cx="5492750" cy="3092450"/>
           </a:xfrm>
           <a:prstGeom prst="rect"/>
           <a:noFill/>
@@ -971,7 +827,7 @@
         <p:spPr>
           <a:xfrm rot="0">
             <a:off x="685800" y="4400550"/>
-            <a:ext cx="5491480" cy="3605530"/>
+            <a:ext cx="5492750" cy="3606800"/>
           </a:xfrm>
           <a:prstGeom prst="rect"/>
         </p:spPr>
@@ -1001,7 +857,7 @@
         <p:spPr>
           <a:xfrm rot="0">
             <a:off x="3884930" y="8685530"/>
-            <a:ext cx="2976880" cy="463550"/>
+            <a:ext cx="2978150" cy="464820"/>
           </a:xfrm>
           <a:prstGeom prst="rect"/>
         </p:spPr>
@@ -1074,7 +930,7 @@
         <p:spPr>
           <a:xfrm rot="0">
             <a:off x="685800" y="1143000"/>
-            <a:ext cx="5492750" cy="3092450"/>
+            <a:ext cx="5492115" cy="3091815"/>
           </a:xfrm>
           <a:prstGeom prst="rect"/>
           <a:noFill/>
@@ -1113,7 +969,7 @@
         <p:spPr>
           <a:xfrm rot="0">
             <a:off x="685800" y="4400550"/>
-            <a:ext cx="5492750" cy="3606800"/>
+            <a:ext cx="5492115" cy="3606165"/>
           </a:xfrm>
           <a:prstGeom prst="rect"/>
         </p:spPr>
@@ -1143,7 +999,7 @@
         <p:spPr>
           <a:xfrm rot="0">
             <a:off x="3884930" y="8685530"/>
-            <a:ext cx="2978150" cy="464820"/>
+            <a:ext cx="2977515" cy="464185"/>
           </a:xfrm>
           <a:prstGeom prst="rect"/>
         </p:spPr>
@@ -1216,7 +1072,7 @@
         <p:spPr>
           <a:xfrm rot="0">
             <a:off x="685800" y="1143000"/>
-            <a:ext cx="5492115" cy="3091815"/>
+            <a:ext cx="5492750" cy="3092450"/>
           </a:xfrm>
           <a:prstGeom prst="rect"/>
           <a:noFill/>
@@ -1255,7 +1111,7 @@
         <p:spPr>
           <a:xfrm rot="0">
             <a:off x="685800" y="4400550"/>
-            <a:ext cx="5492115" cy="3606165"/>
+            <a:ext cx="5492750" cy="3606800"/>
           </a:xfrm>
           <a:prstGeom prst="rect"/>
         </p:spPr>
@@ -1285,7 +1141,7 @@
         <p:spPr>
           <a:xfrm rot="0">
             <a:off x="3884930" y="8685530"/>
-            <a:ext cx="2977515" cy="464185"/>
+            <a:ext cx="2978150" cy="464820"/>
           </a:xfrm>
           <a:prstGeom prst="rect"/>
         </p:spPr>
@@ -1358,7 +1214,7 @@
         <p:spPr>
           <a:xfrm rot="0">
             <a:off x="685800" y="1143000"/>
-            <a:ext cx="5492750" cy="3092450"/>
+            <a:ext cx="5493385" cy="3093085"/>
           </a:xfrm>
           <a:prstGeom prst="rect"/>
           <a:noFill/>
@@ -1397,7 +1253,7 @@
         <p:spPr>
           <a:xfrm rot="0">
             <a:off x="685800" y="4400550"/>
-            <a:ext cx="5492750" cy="3606800"/>
+            <a:ext cx="5493385" cy="3607435"/>
           </a:xfrm>
           <a:prstGeom prst="rect"/>
         </p:spPr>
@@ -1427,7 +1283,7 @@
         <p:spPr>
           <a:xfrm rot="0">
             <a:off x="3884930" y="8685530"/>
-            <a:ext cx="2978150" cy="464820"/>
+            <a:ext cx="2978785" cy="465455"/>
           </a:xfrm>
           <a:prstGeom prst="rect"/>
         </p:spPr>
@@ -1500,7 +1356,7 @@
         <p:spPr>
           <a:xfrm rot="0">
             <a:off x="685800" y="1143000"/>
-            <a:ext cx="5493385" cy="3093085"/>
+            <a:ext cx="5494020" cy="3093720"/>
           </a:xfrm>
           <a:prstGeom prst="rect"/>
           <a:noFill/>
@@ -1539,7 +1395,7 @@
         <p:spPr>
           <a:xfrm rot="0">
             <a:off x="685800" y="4400550"/>
-            <a:ext cx="5493385" cy="3607435"/>
+            <a:ext cx="5494020" cy="3608070"/>
           </a:xfrm>
           <a:prstGeom prst="rect"/>
         </p:spPr>
@@ -1569,7 +1425,7 @@
         <p:spPr>
           <a:xfrm rot="0">
             <a:off x="3884930" y="8685530"/>
-            <a:ext cx="2978785" cy="465455"/>
+            <a:ext cx="2979420" cy="466090"/>
           </a:xfrm>
           <a:prstGeom prst="rect"/>
         </p:spPr>
@@ -1642,7 +1498,7 @@
         <p:spPr>
           <a:xfrm rot="0">
             <a:off x="685800" y="1143000"/>
-            <a:ext cx="5493385" cy="3093085"/>
+            <a:ext cx="5494655" cy="3094355"/>
           </a:xfrm>
           <a:prstGeom prst="rect"/>
           <a:noFill/>
@@ -1681,7 +1537,7 @@
         <p:spPr>
           <a:xfrm rot="0">
             <a:off x="685800" y="4400550"/>
-            <a:ext cx="5493385" cy="3607435"/>
+            <a:ext cx="5494655" cy="3608705"/>
           </a:xfrm>
           <a:prstGeom prst="rect"/>
         </p:spPr>
@@ -1711,149 +1567,7 @@
         <p:spPr>
           <a:xfrm rot="0">
             <a:off x="3884930" y="8685530"/>
-            <a:ext cx="2978785" cy="465455"/>
-          </a:xfrm>
-          <a:prstGeom prst="rect"/>
-        </p:spPr>
-        <p:txBody>
-          <a:bodyPr wrap="square" lIns="91440" tIns="45720" rIns="91440" bIns="45720" numCol="1" vert="horz" anchor="b">
-            <a:noAutofit/>
-          </a:bodyPr>
-          <a:lstStyle>
-            <a:lvl1pPr marL="0" indent="0" algn="r" latinLnBrk="0">
-              <a:buFontTx/>
-              <a:buNone/>
-              <a:defRPr lang="en-GB" altLang="en-US" sz="1200"/>
-            </a:lvl1pPr>
-          </a:lstStyle>
-          <a:p>
-            <a:pPr marL="0" indent="0" latinLnBrk="0">
-              <a:buFontTx/>
-              <a:buNone/>
-            </a:pPr>
-            <a:fld id="{B9320F77-B9A0-41C5-862A-B4B631284C64}" type="slidenum">
-              <a:rPr lang="ko-KR" altLang="en-US"/>
-              <a:t>‹#›</a:t>
-            </a:fld>
-          </a:p>
-        </p:txBody>
-      </p:sp>
-    </p:spTree>
-  </p:cSld>
-  <p:clrMapOvr>
-    <a:masterClrMapping/>
-  </p:clrMapOvr>
-  <mc:AlternateContent xmlns:mc="http://schemas.openxmlformats.org/markup-compatibility/2006">
-    <mc:Choice xmlns:p14="http://schemas.microsoft.com/office/powerpoint/2010/main" Requires="p14">
-      <p:transition spd="slow" p14:dur="0"/>
-    </mc:Choice>
-    <mc:Fallback>
-      <p:transition spd="slow"/>
-    </mc:Fallback>
-  </mc:AlternateContent>
-</p:notes>
-</file>
-
-<file path=ppt/notesSlides/notesSlide9.xml><?xml version="1.0" encoding="utf-8"?>
-<p:notes xmlns:a="http://schemas.openxmlformats.org/drawingml/2006/main" xmlns:r="http://schemas.openxmlformats.org/officeDocument/2006/relationships" xmlns:p="http://schemas.openxmlformats.org/presentationml/2006/main">
-  <p:cSld>
-    <p:spTree>
-      <p:nvGrpSpPr>
-        <p:cNvPr id="1" name=""/>
-        <p:cNvGrpSpPr/>
-        <p:nvPr/>
-      </p:nvGrpSpPr>
-      <p:grpSpPr>
-        <a:xfrm>
-          <a:off x="0" y="0"/>
-          <a:ext cx="0" cy="0"/>
-          <a:chOff x="0" y="0"/>
-          <a:chExt cx="0" cy="0"/>
-        </a:xfrm>
-      </p:grpSpPr>
-      <p:sp>
-        <p:nvSpPr>
-          <p:cNvPr id="2" name="슬라이드 이미지 개체 틀 3"/>
-          <p:cNvSpPr>
-            <a:spLocks noChangeAspect="1"/>
-          </p:cNvSpPr>
-          <p:nvPr>
-            <p:ph type="sldImg" idx="2"/>
-          </p:nvPr>
-        </p:nvSpPr>
-        <p:spPr>
-          <a:xfrm rot="0">
-            <a:off x="685800" y="1143000"/>
-            <a:ext cx="5494020" cy="3093720"/>
-          </a:xfrm>
-          <a:prstGeom prst="rect"/>
-          <a:noFill/>
-          <a:ln w="12700" cap="flat" cmpd="sng">
-            <a:solidFill>
-              <a:srgbClr val="000000">
-                <a:alpha val="100000"/>
-              </a:srgbClr>
-            </a:solidFill>
-            <a:prstDash val="solid"/>
-          </a:ln>
-        </p:spPr>
-        <p:txBody>
-          <a:bodyPr wrap="square" lIns="91440" tIns="45720" rIns="91440" bIns="45720" numCol="1" vert="horz" anchor="ctr">
-            <a:noAutofit/>
-          </a:bodyPr>
-          <a:lstStyle/>
-          <a:p>
-            <a:pPr marL="0" indent="0" latinLnBrk="0">
-              <a:buFontTx/>
-              <a:buNone/>
-            </a:pPr>
-          </a:p>
-        </p:txBody>
-      </p:sp>
-      <p:sp>
-        <p:nvSpPr>
-          <p:cNvPr id="3" name="슬라이드 노트 개체 틀 4"/>
-          <p:cNvSpPr txBox="1">
-            <a:spLocks/>
-          </p:cNvSpPr>
-          <p:nvPr>
-            <p:ph type="body" idx="3"/>
-          </p:nvPr>
-        </p:nvSpPr>
-        <p:spPr>
-          <a:xfrm rot="0">
-            <a:off x="685800" y="4400550"/>
-            <a:ext cx="5494020" cy="3608070"/>
-          </a:xfrm>
-          <a:prstGeom prst="rect"/>
-        </p:spPr>
-        <p:txBody>
-          <a:bodyPr wrap="square" lIns="91440" tIns="45720" rIns="91440" bIns="45720" numCol="1" vert="horz" anchor="t">
-            <a:noAutofit/>
-          </a:bodyPr>
-          <a:lstStyle/>
-          <a:p>
-            <a:pPr marL="0" indent="0" latinLnBrk="0">
-              <a:buFontTx/>
-              <a:buNone/>
-            </a:pPr>
-          </a:p>
-        </p:txBody>
-      </p:sp>
-      <p:sp>
-        <p:nvSpPr>
-          <p:cNvPr id="4" name="슬라이드 번호 개체 틀 6"/>
-          <p:cNvSpPr txBox="1">
-            <a:spLocks/>
-          </p:cNvSpPr>
-          <p:nvPr>
-            <p:ph type="sldNum" idx="5"/>
-          </p:nvPr>
-        </p:nvSpPr>
-        <p:spPr>
-          <a:xfrm rot="0">
-            <a:off x="3884930" y="8685530"/>
-            <a:ext cx="2979420" cy="466090"/>
+            <a:ext cx="2980055" cy="466725"/>
           </a:xfrm>
           <a:prstGeom prst="rect"/>
         </p:spPr>
@@ -5976,7 +5690,7 @@
 </p:sld>
 </file>
 
-<file path=ppt/slides/slide10.xml><?xml version="1.0" encoding="utf-8"?>
+<file path=ppt/slides/slide2.xml><?xml version="1.0" encoding="utf-8"?>
 <p:sld xmlns:a="http://schemas.openxmlformats.org/drawingml/2006/main" xmlns:r="http://schemas.openxmlformats.org/officeDocument/2006/relationships" xmlns:p="http://schemas.openxmlformats.org/presentationml/2006/main" xmlns:p14="http://schemas.microsoft.com/office/powerpoint/2010/main">
   <p:cSld>
     <p:spTree>
@@ -6016,7 +5730,7 @@
         <p:spPr>
           <a:xfrm rot="0">
             <a:off x="0" y="0"/>
-            <a:ext cx="12193270" cy="6863715"/>
+            <a:ext cx="12192635" cy="6861810"/>
           </a:xfrm>
           <a:prstGeom prst="rect"/>
           <a:noFill/>
@@ -6032,8 +5746,8 @@
         </p:nvSpPr>
         <p:spPr>
           <a:xfrm rot="0">
-            <a:off x="8792845" y="-1270"/>
-            <a:ext cx="1948180" cy="554990"/>
+            <a:off x="8100695" y="-1270"/>
+            <a:ext cx="3504565" cy="555625"/>
           </a:xfrm>
           <a:prstGeom prst="rect"/>
           <a:noFill/>
@@ -6060,7 +5774,7 @@
                 <a:latin typeface="맑은 고딕" charset="0"/>
                 <a:ea typeface="맑은 고딕" charset="0"/>
               </a:rPr>
-              <a:t>Hierarchy</a:t>
+              <a:t>Asset Serialization</a:t>
             </a:r>
             <a:endParaRPr lang="ko-KR" altLang="en-US" sz="3000" b="1">
               <a:solidFill>
@@ -6074,7 +5788,7 @@
       </p:sp>
       <p:sp>
         <p:nvSpPr>
-          <p:cNvPr id="1035" name="Rect 0"/>
+          <p:cNvPr id="1045" name="Rect 0"/>
           <p:cNvSpPr txBox="1">
             <a:spLocks/>
           </p:cNvSpPr>
@@ -6082,8 +5796,8 @@
         </p:nvSpPr>
         <p:spPr>
           <a:xfrm rot="0">
-            <a:off x="1209675" y="1096645"/>
-            <a:ext cx="4421505" cy="923925"/>
+            <a:off x="1162050" y="4933950"/>
+            <a:ext cx="4420235" cy="923925"/>
           </a:xfrm>
           <a:prstGeom prst="rect"/>
           <a:noFill/>
@@ -6107,7 +5821,7 @@
                 <a:latin typeface="맑은 고딕" charset="0"/>
                 <a:ea typeface="맑은 고딕" charset="0"/>
               </a:rPr>
-              <a:t>계층구조는 현재 게임 화면에 배치되어 있는 게임 오브젝트를 표시하고 관리하는 영역입니다.</a:t>
+              <a:t>유니티에서 오브젝트 파일을 저장하는 방식은 바이너리, 텍스트, 바이너리 + 텍스트로 혼합한 방식이 있습니다. </a:t>
             </a:r>
             <a:endParaRPr lang="ko-KR" altLang="en-US" sz="1800">
               <a:latin typeface="맑은 고딕" charset="0"/>
@@ -6118,7 +5832,7 @@
       </p:sp>
       <p:sp>
         <p:nvSpPr>
-          <p:cNvPr id="1045" name="Rect 0"/>
+          <p:cNvPr id="1076" name="텍스트 상자 4"/>
           <p:cNvSpPr txBox="1">
             <a:spLocks/>
           </p:cNvSpPr>
@@ -6126,8 +5840,8 @@
         </p:nvSpPr>
         <p:spPr>
           <a:xfrm rot="0">
-            <a:off x="1272540" y="4935855"/>
-            <a:ext cx="4431030" cy="923925"/>
+            <a:off x="7240270" y="3549650"/>
+            <a:ext cx="3957955" cy="2308225"/>
           </a:xfrm>
           <a:prstGeom prst="rect"/>
           <a:noFill/>
@@ -6151,40 +5865,23 @@
                 <a:latin typeface="맑은 고딕" charset="0"/>
                 <a:ea typeface="맑은 고딕" charset="0"/>
               </a:rPr>
-              <a:t>계층구조의 순서는 알파벳 순서로 정렬되며 게임 오브젝트 안에 게임 오브젝트를 넣을 수도 있습니다.</a:t>
+              <a:t>바이너리 포맷의 형식은 사람이 이해하기 어렵고 github에 충돌이 발생했을 때 merge 과정이 굉장히 복잡해집니다.</a:t>
             </a:r>
             <a:endParaRPr lang="ko-KR" altLang="en-US" sz="1800">
               <a:latin typeface="맑은 고딕" charset="0"/>
               <a:ea typeface="맑은 고딕" charset="0"/>
             </a:endParaRPr>
           </a:p>
-        </p:txBody>
-      </p:sp>
-      <p:sp>
-        <p:nvSpPr>
-          <p:cNvPr id="1091" name="Rect 0"/>
-          <p:cNvSpPr txBox="1">
-            <a:spLocks/>
-          </p:cNvSpPr>
-          <p:nvPr/>
-        </p:nvSpPr>
-        <p:spPr>
-          <a:xfrm rot="0">
-            <a:off x="6873875" y="4105275"/>
-            <a:ext cx="4207510" cy="1754505"/>
-          </a:xfrm>
-          <a:prstGeom prst="rect"/>
-          <a:noFill/>
-          <a:ln w="0">
-            <a:noFill/>
-            <a:prstDash/>
-          </a:ln>
-        </p:spPr>
-        <p:txBody>
-          <a:bodyPr wrap="square" lIns="89535" tIns="46355" rIns="89535" bIns="46355" numCol="1" vert="horz" anchor="t">
-            <a:spAutoFit/>
-          </a:bodyPr>
-          <a:lstStyle/>
+          <a:p>
+            <a:pPr marL="0" indent="0" algn="l" latinLnBrk="0" hangingPunct="1">
+              <a:buFontTx/>
+              <a:buNone/>
+            </a:pPr>
+            <a:endParaRPr lang="ko-KR" altLang="en-US" sz="1800">
+              <a:latin typeface="맑은 고딕" charset="0"/>
+              <a:ea typeface="맑은 고딕" charset="0"/>
+            </a:endParaRPr>
+          </a:p>
           <a:p>
             <a:pPr marL="0" indent="0" algn="l" latinLnBrk="0" hangingPunct="1">
               <a:buFontTx/>
@@ -6195,58 +5892,28 @@
                 <a:latin typeface="맑은 고딕" charset="0"/>
                 <a:ea typeface="맑은 고딕" charset="0"/>
               </a:rPr>
-              <a:t>게임 오브젝트 안에 게임 오브젝트가 들어가게 되면 (상위 오브젝트) - (하위 오브젝트)로 분류됩니다.</a:t>
+              <a:t>그렇기 때문에 에셋 직렬화 방식은 Force Text 형식으로 통일하는 것을 권장합니다.</a:t>
             </a:r>
             <a:endParaRPr lang="ko-KR" altLang="en-US" sz="1800">
               <a:latin typeface="맑은 고딕" charset="0"/>
               <a:ea typeface="맑은 고딕" charset="0"/>
             </a:endParaRPr>
           </a:p>
-          <a:p>
-            <a:pPr marL="0" indent="0" algn="l" latinLnBrk="0" hangingPunct="1">
-              <a:buFontTx/>
-              <a:buNone/>
-            </a:pPr>
-            <a:r>
-              <a:rPr lang="ko-KR" sz="1800">
-                <a:latin typeface="맑은 고딕" charset="0"/>
-                <a:ea typeface="맑은 고딕" charset="0"/>
-              </a:rPr>
-              <a:t/>
-            </a:r>
-            <a:br>
-              <a:rPr lang="ko-KR" sz="1800">
-                <a:latin typeface="맑은 고딕" charset="0"/>
-                <a:ea typeface="맑은 고딕" charset="0"/>
-              </a:rPr>
-            </a:br>
-            <a:r>
-              <a:rPr lang="ko-KR" sz="1800">
-                <a:latin typeface="맑은 고딕" charset="0"/>
-                <a:ea typeface="맑은 고딕" charset="0"/>
-              </a:rPr>
-              <a:t>하위 오브젝트는 상위 오브젝트의 변화가 생기면 똑같이 영향을 받습니다.</a:t>
-            </a:r>
-            <a:endParaRPr lang="ko-KR" altLang="en-US" sz="1800">
-              <a:latin typeface="맑은 고딕" charset="0"/>
-              <a:ea typeface="맑은 고딕" charset="0"/>
-            </a:endParaRPr>
-          </a:p>
         </p:txBody>
       </p:sp>
       <p:pic>
         <p:nvPicPr>
-          <p:cNvPr id="1097" name="그림 1" descr="C:/Users/Admin1/AppData/Roaming/PolarisOffice/ETemp/9284_9875952/fImage910422641.png"/>
+          <p:cNvPr id="1078" name="그림 7"/>
           <p:cNvPicPr>
             <a:picLocks noChangeAspect="1"/>
           </p:cNvPicPr>
           <p:nvPr/>
         </p:nvPicPr>
         <p:blipFill rotWithShape="1">
-          <a:blip r:embed="rId3" cstate="hqprint">
+          <a:blip r:embed="rId6" cstate="print">
             <a:extLst>
               <a:ext uri="{28A0092B-C50C-407E-A947-70E740481C1C}">
-                <a14:useLocalDpi xmlns:a14="http://schemas.microsoft.com/office/drawing/2010/main"/>
+                <a14:useLocalDpi xmlns:a14="http://schemas.microsoft.com/office/drawing/2010/main" val="0"/>
               </a:ext>
             </a:extLst>
           </a:blip>
@@ -6256,18 +5923,16 @@
         </p:blipFill>
         <p:spPr>
           <a:xfrm rot="0">
-            <a:off x="1214120" y="2171700"/>
-            <a:ext cx="1835150" cy="2696845"/>
-          </a:xfrm>
-          <a:prstGeom prst="roundRect"/>
-          <a:solidFill>
-            <a:srgbClr val="EDEDED"/>
-          </a:solidFill>
+            <a:off x="1157605" y="1000125"/>
+            <a:ext cx="4434205" cy="3772535"/>
+          </a:xfrm>
+          <a:prstGeom prst="rect"/>
+          <a:noFill/>
         </p:spPr>
       </p:pic>
       <p:sp>
         <p:nvSpPr>
-          <p:cNvPr id="1099" name="도형 3"/>
+          <p:cNvPr id="1079" name="도형 8"/>
           <p:cNvSpPr>
             <a:spLocks/>
           </p:cNvSpPr>
@@ -6275,20 +5940,19 @@
         </p:nvSpPr>
         <p:spPr>
           <a:xfrm rot="0">
-            <a:off x="3238500" y="3371850"/>
-            <a:ext cx="362585" cy="191135"/>
-          </a:xfrm>
-          <a:prstGeom prst="notchedRightArrow"/>
-          <a:scene3d>
-            <a:camera prst="orthographicFront"/>
-            <a:lightRig rig="threePt" dir="t"/>
-          </a:scene3d>
-          <a:sp3d prstMaterial="warmMatte">
-            <a:bevelT w="76200" h="76200" prst="circle"/>
-            <a:contourClr>
-              <a:srgbClr val="000000"/>
-            </a:contourClr>
-          </a:sp3d>
+            <a:off x="3781425" y="1952625"/>
+            <a:ext cx="1762760" cy="200660"/>
+          </a:xfrm>
+          <a:prstGeom prst="rect"/>
+          <a:noFill/>
+          <a:ln w="12700" cap="flat" cmpd="sng">
+            <a:solidFill>
+              <a:srgbClr val="FF0000">
+                <a:alpha val="100000"/>
+              </a:srgbClr>
+            </a:solidFill>
+            <a:prstDash val="solid"/>
+          </a:ln>
         </p:spPr>
         <p:style>
           <a:lnRef idx="2">
@@ -6322,14 +5986,14 @@
       </p:sp>
       <p:pic>
         <p:nvPicPr>
-          <p:cNvPr id="1100" name="그림 5" descr="C:/Users/Admin1/AppData/Roaming/PolarisOffice/ETemp/9284_9875952/fImage2054942298467.png"/>
+          <p:cNvPr id="1080" name="그림 11"/>
           <p:cNvPicPr>
             <a:picLocks noChangeAspect="1"/>
           </p:cNvPicPr>
           <p:nvPr/>
         </p:nvPicPr>
         <p:blipFill rotWithShape="1">
-          <a:blip r:embed="rId4" cstate="hqprint">
+          <a:blip r:embed="rId7" cstate="hqprint">
             <a:extLst>
               <a:ext uri="{28A0092B-C50C-407E-A947-70E740481C1C}">
                 <a14:useLocalDpi xmlns:a14="http://schemas.microsoft.com/office/drawing/2010/main"/>
@@ -6342,8 +6006,8 @@
         </p:blipFill>
         <p:spPr>
           <a:xfrm rot="0">
-            <a:off x="3800475" y="2171700"/>
-            <a:ext cx="1820545" cy="2706370"/>
+            <a:off x="7943850" y="989330"/>
+            <a:ext cx="3249295" cy="1316990"/>
           </a:xfrm>
           <a:prstGeom prst="roundRect"/>
           <a:solidFill>
@@ -6353,14 +6017,14 @@
       </p:pic>
       <p:pic>
         <p:nvPicPr>
-          <p:cNvPr id="1101" name="그림 6" descr="C:/Users/Admin1/AppData/Roaming/PolarisOffice/ETemp/9284_9875952/fImage134002306334.png"/>
+          <p:cNvPr id="1081" name="그림 14"/>
           <p:cNvPicPr>
             <a:picLocks noChangeAspect="1"/>
           </p:cNvPicPr>
           <p:nvPr/>
         </p:nvPicPr>
         <p:blipFill rotWithShape="1">
-          <a:blip r:embed="rId5" cstate="hqprint">
+          <a:blip r:embed="rId8" cstate="hqprint">
             <a:extLst>
               <a:ext uri="{28A0092B-C50C-407E-A947-70E740481C1C}">
                 <a14:useLocalDpi xmlns:a14="http://schemas.microsoft.com/office/drawing/2010/main"/>
@@ -6373,379 +6037,58 @@
         </p:blipFill>
         <p:spPr>
           <a:xfrm rot="0">
-            <a:off x="6886575" y="1099820"/>
-            <a:ext cx="2277745" cy="2921000"/>
-          </a:xfrm>
-          <a:prstGeom prst="roundRect"/>
-          <a:solidFill>
-            <a:srgbClr val="EDEDED"/>
-          </a:solidFill>
+            <a:off x="7934325" y="2400300"/>
+            <a:ext cx="3255645" cy="1172845"/>
+          </a:xfrm>
+          <a:prstGeom prst="rect"/>
+          <a:noFill/>
         </p:spPr>
       </p:pic>
-      <p:pic>
-        <p:nvPicPr>
-          <p:cNvPr id="1102" name="그림 8" descr="C:/Users/Admin1/AppData/Roaming/PolarisOffice/ETemp/9284_9875952/fImage20212336500.png"/>
-          <p:cNvPicPr>
-            <a:picLocks noChangeAspect="1"/>
-          </p:cNvPicPr>
+      <p:sp>
+        <p:nvSpPr>
+          <p:cNvPr id="1082" name="도형 15"/>
+          <p:cNvSpPr>
+            <a:spLocks/>
+          </p:cNvSpPr>
           <p:nvPr/>
-        </p:nvPicPr>
-        <p:blipFill rotWithShape="1">
-          <a:blip r:embed="rId6" cstate="hqprint">
-            <a:extLst>
-              <a:ext uri="{28A0092B-C50C-407E-A947-70E740481C1C}">
-                <a14:useLocalDpi xmlns:a14="http://schemas.microsoft.com/office/drawing/2010/main"/>
-              </a:ext>
-            </a:extLst>
-          </a:blip>
-          <a:stretch>
-            <a:fillRect/>
-          </a:stretch>
-        </p:blipFill>
-        <p:spPr>
-          <a:xfrm rot="0">
-            <a:off x="9372600" y="1557020"/>
-            <a:ext cx="1696720" cy="2144395"/>
-          </a:xfrm>
-          <a:prstGeom prst="rect"/>
-          <a:noFill/>
-        </p:spPr>
-      </p:pic>
-    </p:spTree>
-  </p:cSld>
-  <p:clrMapOvr>
-    <a:masterClrMapping/>
-  </p:clrMapOvr>
-  <mc:AlternateContent xmlns:mc="http://schemas.openxmlformats.org/markup-compatibility/2006">
-    <mc:Choice xmlns:p14="http://schemas.microsoft.com/office/powerpoint/2010/main" Requires="p14">
-      <p:transition spd="slow" p14:dur="2000"/>
-    </mc:Choice>
-    <mc:Fallback>
-      <p:transition spd="slow"/>
-    </mc:Fallback>
-  </mc:AlternateContent>
-  <p:timing>
-    <p:tnLst>
-      <p:par>
-        <p:cTn id="1" dur="indefinite" restart="never" nodeType="tmRoot"/>
-      </p:par>
-    </p:tnLst>
-  </p:timing>
-</p:sld>
-</file>
-
-<file path=ppt/slides/slide2.xml><?xml version="1.0" encoding="utf-8"?>
-<p:sld xmlns:a="http://schemas.openxmlformats.org/drawingml/2006/main" xmlns:r="http://schemas.openxmlformats.org/officeDocument/2006/relationships" xmlns:p="http://schemas.openxmlformats.org/presentationml/2006/main" xmlns:p14="http://schemas.microsoft.com/office/powerpoint/2010/main">
-  <p:cSld>
-    <p:spTree>
-      <p:nvGrpSpPr>
-        <p:cNvPr id="1" name=""/>
-        <p:cNvGrpSpPr/>
-        <p:nvPr/>
-      </p:nvGrpSpPr>
-      <p:grpSpPr>
-        <a:xfrm>
-          <a:off x="0" y="0"/>
-          <a:ext cx="0" cy="0"/>
-          <a:chOff x="0" y="0"/>
-          <a:chExt cx="0" cy="0"/>
-        </a:xfrm>
-      </p:grpSpPr>
-      <p:pic>
-        <p:nvPicPr>
-          <p:cNvPr id="1032" name="Picture "/>
-          <p:cNvPicPr>
-            <a:picLocks noChangeAspect="1"/>
-          </p:cNvPicPr>
-          <p:nvPr/>
-        </p:nvPicPr>
-        <p:blipFill rotWithShape="1">
-          <a:blip r:embed="rId2" cstate="hqprint">
-            <a:extLst>
-              <a:ext uri="{28A0092B-C50C-407E-A947-70E740481C1C}">
-                <a14:useLocalDpi xmlns:a14="http://schemas.microsoft.com/office/drawing/2010/main"/>
-              </a:ext>
-            </a:extLst>
-          </a:blip>
-          <a:stretch>
-            <a:fillRect/>
-          </a:stretch>
-        </p:blipFill>
-        <p:spPr>
-          <a:xfrm rot="0">
-            <a:off x="0" y="0"/>
-            <a:ext cx="12192635" cy="6861810"/>
-          </a:xfrm>
-          <a:prstGeom prst="rect"/>
-          <a:noFill/>
-        </p:spPr>
-      </p:pic>
-      <p:sp>
-        <p:nvSpPr>
-          <p:cNvPr id="1031" name="Rect 0"/>
-          <p:cNvSpPr txBox="1">
-            <a:spLocks/>
-          </p:cNvSpPr>
-          <p:nvPr/>
-        </p:nvSpPr>
-        <p:spPr>
-          <a:xfrm rot="0">
-            <a:off x="8656955" y="3175"/>
-            <a:ext cx="2275840" cy="554990"/>
-          </a:xfrm>
-          <a:prstGeom prst="rect"/>
-          <a:noFill/>
-          <a:ln w="0">
-            <a:noFill/>
-            <a:prstDash/>
-          </a:ln>
-        </p:spPr>
-        <p:txBody>
-          <a:bodyPr wrap="square" lIns="89535" tIns="46355" rIns="89535" bIns="46355" numCol="1" vert="horz" anchor="t">
-            <a:spAutoFit/>
-          </a:bodyPr>
-          <a:lstStyle/>
-          <a:p>
-            <a:pPr marL="0" indent="0" algn="l" latinLnBrk="0">
-              <a:buFontTx/>
-              <a:buNone/>
-            </a:pPr>
-            <a:r>
-              <a:rPr lang="ko-KR" altLang="en-US" sz="3000" b="1">
-                <a:solidFill>
-                  <a:schemeClr val="tx1"/>
-                </a:solidFill>
-                <a:latin typeface="맑은 고딕" charset="0"/>
-                <a:ea typeface="맑은 고딕" charset="0"/>
-              </a:rPr>
-              <a:t>Asset Store</a:t>
-            </a:r>
-            <a:endParaRPr lang="ko-KR" altLang="en-US" sz="3000" b="1">
-              <a:solidFill>
-                <a:schemeClr val="tx1"/>
-              </a:solidFill>
-              <a:latin typeface="맑은 고딕" charset="0"/>
-              <a:ea typeface="맑은 고딕" charset="0"/>
-            </a:endParaRPr>
-          </a:p>
-        </p:txBody>
-      </p:sp>
-      <p:sp>
-        <p:nvSpPr>
-          <p:cNvPr id="1035" name="Rect 0"/>
-          <p:cNvSpPr txBox="1">
-            <a:spLocks/>
-          </p:cNvSpPr>
-          <p:nvPr/>
-        </p:nvSpPr>
-        <p:spPr>
-          <a:xfrm rot="0">
-            <a:off x="1189355" y="1280795"/>
-            <a:ext cx="4251325" cy="1200785"/>
-          </a:xfrm>
-          <a:prstGeom prst="rect"/>
-          <a:noFill/>
-          <a:ln w="0">
-            <a:noFill/>
-            <a:prstDash/>
-          </a:ln>
-        </p:spPr>
-        <p:txBody>
-          <a:bodyPr wrap="square" lIns="89535" tIns="46355" rIns="89535" bIns="46355" numCol="1" vert="horz" anchor="t">
-            <a:spAutoFit/>
-          </a:bodyPr>
-          <a:lstStyle/>
-          <a:p>
-            <a:pPr marL="0" indent="0" algn="l" latinLnBrk="0" hangingPunct="1">
-              <a:buFontTx/>
-              <a:buNone/>
-            </a:pPr>
-            <a:r>
-              <a:rPr lang="ko-KR" sz="1800">
-                <a:latin typeface="맑은 고딕" charset="0"/>
-                <a:ea typeface="맑은 고딕" charset="0"/>
-              </a:rPr>
-              <a:t>에셋 스토어</a:t>
-            </a:r>
-            <a:r>
-              <a:rPr lang="ko-KR" sz="1800">
-                <a:latin typeface="맑은 고딕" charset="0"/>
-                <a:ea typeface="맑은 고딕" charset="0"/>
-              </a:rPr>
-              <a:t>란?</a:t>
-            </a:r>
+        </p:nvSpPr>
+        <p:spPr>
+          <a:xfrm rot="0">
+            <a:off x="7229475" y="1571625"/>
+            <a:ext cx="505460" cy="1743710"/>
+          </a:xfrm>
+          <a:prstGeom prst="curvedRightArrow"/>
+        </p:spPr>
+        <p:style>
+          <a:lnRef idx="2">
+            <a:schemeClr val="accent1">
+              <a:shade val="50000"/>
+            </a:schemeClr>
+          </a:lnRef>
+          <a:fillRef idx="1">
+            <a:schemeClr val="accent1"/>
+          </a:fillRef>
+          <a:effectRef idx="0">
+            <a:schemeClr val="accent1"/>
+          </a:effectRef>
+          <a:fontRef idx="minor">
+            <a:schemeClr val="lt1"/>
+          </a:fontRef>
+        </p:style>
+        <p:txBody>
+          <a:bodyPr wrap="square" lIns="91440" tIns="45720" rIns="91440" bIns="45720" vert="horz" anchor="ctr">
+            <a:noAutofit/>
+          </a:bodyPr>
+          <a:lstStyle/>
+          <a:p>
+            <a:pPr marL="0" indent="0" algn="ctr" hangingPunct="1"/>
             <a:endParaRPr lang="ko-KR" altLang="en-US" sz="1800">
               <a:latin typeface="맑은 고딕" charset="0"/>
               <a:ea typeface="맑은 고딕" charset="0"/>
             </a:endParaRPr>
           </a:p>
-          <a:p>
-            <a:pPr marL="0" indent="0" algn="l" latinLnBrk="0" hangingPunct="1">
-              <a:buFontTx/>
-              <a:buNone/>
-            </a:pPr>
-            <a:r>
-              <a:rPr lang="ko-KR" sz="1800">
-                <a:latin typeface="맑은 고딕" charset="0"/>
-                <a:ea typeface="맑은 고딕" charset="0"/>
-              </a:rPr>
-              <a:t>그래픽, 사운드, 모델과 같은 리소스를 다운로드 받을 수 있는 유니티 전용 스토어입니다.</a:t>
-            </a:r>
-            <a:endParaRPr lang="ko-KR" altLang="en-US" sz="1800">
-              <a:latin typeface="맑은 고딕" charset="0"/>
-              <a:ea typeface="맑은 고딕" charset="0"/>
-            </a:endParaRPr>
-          </a:p>
-        </p:txBody>
-      </p:sp>
-      <p:sp>
-        <p:nvSpPr>
-          <p:cNvPr id="1041" name="Rect 0"/>
-          <p:cNvSpPr txBox="1">
-            <a:spLocks/>
-          </p:cNvSpPr>
-          <p:nvPr/>
-        </p:nvSpPr>
-        <p:spPr>
-          <a:xfrm rot="0">
-            <a:off x="1181100" y="4899660"/>
-            <a:ext cx="4267835" cy="647065"/>
-          </a:xfrm>
-          <a:prstGeom prst="rect"/>
-          <a:noFill/>
-          <a:ln w="0">
-            <a:noFill/>
-            <a:prstDash/>
-          </a:ln>
-        </p:spPr>
-        <p:txBody>
-          <a:bodyPr wrap="square" lIns="89535" tIns="46355" rIns="89535" bIns="46355" numCol="1" vert="horz" anchor="t">
-            <a:spAutoFit/>
-          </a:bodyPr>
-          <a:lstStyle/>
-          <a:p>
-            <a:pPr marL="0" indent="0" algn="l" latinLnBrk="0" hangingPunct="1">
-              <a:buFontTx/>
-              <a:buNone/>
-            </a:pPr>
-            <a:r>
-              <a:rPr lang="ko-KR" sz="1800">
-                <a:latin typeface="맑은 고딕" charset="0"/>
-                <a:ea typeface="맑은 고딕" charset="0"/>
-              </a:rPr>
-              <a:t>에셋 스토어를 다운로드 할 때 유로 에셋과 무료 에셋이 존재합니다.</a:t>
-            </a:r>
-            <a:endParaRPr lang="ko-KR" altLang="en-US" sz="1800">
-              <a:latin typeface="맑은 고딕" charset="0"/>
-              <a:ea typeface="맑은 고딕" charset="0"/>
-            </a:endParaRPr>
-          </a:p>
-        </p:txBody>
-      </p:sp>
-      <p:pic>
-        <p:nvPicPr>
-          <p:cNvPr id="1043" name="그림 4"/>
-          <p:cNvPicPr>
-            <a:picLocks noChangeAspect="1"/>
-          </p:cNvPicPr>
-          <p:nvPr/>
-        </p:nvPicPr>
-        <p:blipFill rotWithShape="1">
-          <a:blip r:embed="rId13" cstate="hqprint">
-            <a:extLst>
-              <a:ext uri="{28A0092B-C50C-407E-A947-70E740481C1C}">
-                <a14:useLocalDpi xmlns:a14="http://schemas.microsoft.com/office/drawing/2010/main"/>
-              </a:ext>
-            </a:extLst>
-          </a:blip>
-          <a:stretch>
-            <a:fillRect/>
-          </a:stretch>
-        </p:blipFill>
-        <p:spPr>
-          <a:xfrm rot="0">
-            <a:off x="7205345" y="1280795"/>
-            <a:ext cx="4026535" cy="3616960"/>
-          </a:xfrm>
-          <a:prstGeom prst="rect"/>
-          <a:noFill/>
-        </p:spPr>
-      </p:pic>
-      <p:sp>
-        <p:nvSpPr>
-          <p:cNvPr id="1044" name="텍스트 상자 5"/>
-          <p:cNvSpPr txBox="1">
-            <a:spLocks/>
-          </p:cNvSpPr>
-          <p:nvPr/>
-        </p:nvSpPr>
-        <p:spPr>
-          <a:xfrm rot="0">
-            <a:off x="7192645" y="4895215"/>
-            <a:ext cx="4028440" cy="647065"/>
-          </a:xfrm>
-          <a:prstGeom prst="rect"/>
-          <a:noFill/>
-          <a:ln w="0">
-            <a:noFill/>
-            <a:prstDash/>
-          </a:ln>
-        </p:spPr>
-        <p:txBody>
-          <a:bodyPr wrap="square" lIns="89535" tIns="46355" rIns="89535" bIns="46355" numCol="1" vert="horz" anchor="t">
-            <a:spAutoFit/>
-          </a:bodyPr>
-          <a:lstStyle/>
-          <a:p>
-            <a:pPr marL="0" indent="0" algn="l" latinLnBrk="0" hangingPunct="1">
-              <a:buFontTx/>
-              <a:buNone/>
-            </a:pPr>
-            <a:r>
-              <a:rPr lang="ko-KR" sz="1800">
-                <a:latin typeface="맑은 고딕" charset="0"/>
-                <a:ea typeface="맑은 고딕" charset="0"/>
-              </a:rPr>
-              <a:t>특정 항목만 선택해서 리소스를 다운로드 받을 수 있습니다.</a:t>
-            </a:r>
-            <a:endParaRPr lang="ko-KR" altLang="en-US" sz="1800">
-              <a:latin typeface="맑은 고딕" charset="0"/>
-              <a:ea typeface="맑은 고딕" charset="0"/>
-            </a:endParaRPr>
-          </a:p>
-        </p:txBody>
-      </p:sp>
-      <p:pic>
-        <p:nvPicPr>
-          <p:cNvPr id="1045" name="그림 6"/>
-          <p:cNvPicPr>
-            <a:picLocks noChangeAspect="1"/>
-          </p:cNvPicPr>
-          <p:nvPr/>
-        </p:nvPicPr>
-        <p:blipFill rotWithShape="1">
-          <a:blip r:embed="rId14" cstate="hqprint">
-            <a:extLst>
-              <a:ext uri="{28A0092B-C50C-407E-A947-70E740481C1C}">
-                <a14:useLocalDpi xmlns:a14="http://schemas.microsoft.com/office/drawing/2010/main"/>
-              </a:ext>
-            </a:extLst>
-          </a:blip>
-          <a:stretch>
-            <a:fillRect/>
-          </a:stretch>
-        </p:blipFill>
-        <p:spPr>
-          <a:xfrm rot="0">
-            <a:off x="1181100" y="2543175"/>
-            <a:ext cx="4258945" cy="2287270"/>
-          </a:xfrm>
-          <a:prstGeom prst="roundRect"/>
-          <a:solidFill>
-            <a:srgbClr val="EDEDED"/>
-          </a:solidFill>
-        </p:spPr>
-      </p:pic>
+        </p:txBody>
+      </p:sp>
     </p:spTree>
   </p:cSld>
   <p:clrMapOvr>
@@ -6808,8 +6151,8 @@
         </p:blipFill>
         <p:spPr>
           <a:xfrm rot="0">
-            <a:off x="0" y="0"/>
-            <a:ext cx="12192635" cy="6861810"/>
+            <a:off x="0" y="1905"/>
+            <a:ext cx="12179300" cy="6862445"/>
           </a:xfrm>
           <a:prstGeom prst="rect"/>
           <a:noFill/>
@@ -6824,9 +6167,9 @@
           <p:nvPr/>
         </p:nvSpPr>
         <p:spPr>
-          <a:xfrm rot="0">
-            <a:off x="8100695" y="-1270"/>
-            <a:ext cx="3504565" cy="555625"/>
+          <a:xfrm>
+            <a:off x="8160385" y="-1270"/>
+            <a:ext cx="3239770" cy="554990"/>
           </a:xfrm>
           <a:prstGeom prst="rect"/>
           <a:noFill/>
@@ -6853,7 +6196,7 @@
                 <a:latin typeface="맑은 고딕" charset="0"/>
                 <a:ea typeface="맑은 고딕" charset="0"/>
               </a:rPr>
-              <a:t>Asset Serialization</a:t>
+              <a:t>meta file</a:t>
             </a:r>
             <a:endParaRPr lang="ko-KR" altLang="en-US" sz="3000" b="1">
               <a:solidFill>
@@ -6867,7 +6210,7 @@
       </p:sp>
       <p:sp>
         <p:nvSpPr>
-          <p:cNvPr id="1045" name="Rect 0"/>
+          <p:cNvPr id="1035" name="Rect 0"/>
           <p:cNvSpPr txBox="1">
             <a:spLocks/>
           </p:cNvSpPr>
@@ -6875,8 +6218,8 @@
         </p:nvSpPr>
         <p:spPr>
           <a:xfrm rot="0">
-            <a:off x="1162050" y="4933950"/>
-            <a:ext cx="4420235" cy="923925"/>
+            <a:off x="1209675" y="1251585"/>
+            <a:ext cx="3883025" cy="1200785"/>
           </a:xfrm>
           <a:prstGeom prst="rect"/>
           <a:noFill/>
@@ -6900,18 +6243,42 @@
                 <a:latin typeface="맑은 고딕" charset="0"/>
                 <a:ea typeface="맑은 고딕" charset="0"/>
               </a:rPr>
-              <a:t>유니티에서 오브젝트 파일을 저장하는 방식은 바이너리, 텍스트, 바이너리 + 텍스트로 혼합한 방식이 있습니다. </a:t>
+              <a:t>메타 파일이</a:t>
+            </a:r>
+            <a:r>
+              <a:rPr lang="ko-KR" sz="1800">
+                <a:latin typeface="맑은 고딕" charset="0"/>
+                <a:ea typeface="맑은 고딕" charset="0"/>
+              </a:rPr>
+              <a:t>란?</a:t>
             </a:r>
             <a:endParaRPr lang="ko-KR" altLang="en-US" sz="1800">
               <a:latin typeface="맑은 고딕" charset="0"/>
               <a:ea typeface="맑은 고딕" charset="0"/>
             </a:endParaRPr>
           </a:p>
-        </p:txBody>
-      </p:sp>
-      <p:sp>
-        <p:nvSpPr>
-          <p:cNvPr id="1076" name="텍스트 상자 4"/>
+          <a:p>
+            <a:pPr marL="0" indent="0" algn="l" latinLnBrk="0" hangingPunct="1">
+              <a:buFontTx/>
+              <a:buNone/>
+            </a:pPr>
+            <a:r>
+              <a:rPr lang="ko-KR" sz="1800">
+                <a:latin typeface="맑은 고딕" charset="0"/>
+                <a:ea typeface="맑은 고딕" charset="0"/>
+              </a:rPr>
+              <a:t>에셋을 식별할 수 있게 하는 값이며, 그 에셋에 대한 설정 값을 저장하는 파일입니다.</a:t>
+            </a:r>
+            <a:endParaRPr lang="ko-KR" altLang="en-US" sz="1800">
+              <a:latin typeface="맑은 고딕" charset="0"/>
+              <a:ea typeface="맑은 고딕" charset="0"/>
+            </a:endParaRPr>
+          </a:p>
+        </p:txBody>
+      </p:sp>
+      <p:sp>
+        <p:nvSpPr>
+          <p:cNvPr id="1045" name="Rect 0"/>
           <p:cNvSpPr txBox="1">
             <a:spLocks/>
           </p:cNvSpPr>
@@ -6919,8 +6286,8 @@
         </p:nvSpPr>
         <p:spPr>
           <a:xfrm rot="0">
-            <a:off x="7240270" y="3549650"/>
-            <a:ext cx="3957955" cy="2308225"/>
+            <a:off x="1221105" y="4763135"/>
+            <a:ext cx="3862705" cy="923925"/>
           </a:xfrm>
           <a:prstGeom prst="rect"/>
           <a:noFill/>
@@ -6944,18 +6311,52 @@
                 <a:latin typeface="맑은 고딕" charset="0"/>
                 <a:ea typeface="맑은 고딕" charset="0"/>
               </a:rPr>
-              <a:t>바이너리 포맷의 형식은 사람이 이해하기 어렵고 github에 충돌이 발생했을 때 merge 과정이 굉장히 복잡해집니다.</a:t>
+              <a:t>만약, 메타 파일이 재생성하게 되면 설정 값이 바뀌게 되면 유니티에서 참조를 잃어버리게 됩니다.</a:t>
             </a:r>
             <a:endParaRPr lang="ko-KR" altLang="en-US" sz="1800">
               <a:latin typeface="맑은 고딕" charset="0"/>
               <a:ea typeface="맑은 고딕" charset="0"/>
             </a:endParaRPr>
           </a:p>
+        </p:txBody>
+      </p:sp>
+      <p:sp>
+        <p:nvSpPr>
+          <p:cNvPr id="1066" name="Rect 0"/>
+          <p:cNvSpPr txBox="1">
+            <a:spLocks/>
+          </p:cNvSpPr>
+          <p:nvPr/>
+        </p:nvSpPr>
+        <p:spPr>
+          <a:xfrm rot="0">
+            <a:off x="6845935" y="3934460"/>
+            <a:ext cx="4307840" cy="1754505"/>
+          </a:xfrm>
+          <a:prstGeom prst="rect"/>
+          <a:noFill/>
+          <a:ln w="0">
+            <a:noFill/>
+            <a:prstDash/>
+          </a:ln>
+        </p:spPr>
+        <p:txBody>
+          <a:bodyPr wrap="square" lIns="89535" tIns="46355" rIns="89535" bIns="46355" numCol="1" vert="horz" anchor="t">
+            <a:spAutoFit/>
+          </a:bodyPr>
+          <a:lstStyle/>
           <a:p>
             <a:pPr marL="0" indent="0" algn="l" latinLnBrk="0" hangingPunct="1">
               <a:buFontTx/>
               <a:buNone/>
             </a:pPr>
+            <a:r>
+              <a:rPr lang="ko-KR" sz="1800">
+                <a:latin typeface="맑은 고딕" charset="0"/>
+                <a:ea typeface="맑은 고딕" charset="0"/>
+              </a:rPr>
+              <a:t>유니티 내부에서 설정을 변경할 때마다 메타 파일은 계속 갱신됩니다.</a:t>
+            </a:r>
             <a:endParaRPr lang="ko-KR" altLang="en-US" sz="1800">
               <a:latin typeface="맑은 고딕" charset="0"/>
               <a:ea typeface="맑은 고딕" charset="0"/>
@@ -6966,12 +6367,22 @@
               <a:buFontTx/>
               <a:buNone/>
             </a:pPr>
+            <a:endParaRPr lang="ko-KR" altLang="en-US" sz="1800">
+              <a:latin typeface="맑은 고딕" charset="0"/>
+              <a:ea typeface="맑은 고딕" charset="0"/>
+            </a:endParaRPr>
+          </a:p>
+          <a:p>
+            <a:pPr marL="0" indent="0" algn="l" latinLnBrk="0" hangingPunct="1">
+              <a:buFontTx/>
+              <a:buNone/>
+            </a:pPr>
             <a:r>
               <a:rPr lang="ko-KR" sz="1800">
                 <a:latin typeface="맑은 고딕" charset="0"/>
                 <a:ea typeface="맑은 고딕" charset="0"/>
               </a:rPr>
-              <a:t>그렇기 때문에 에셋 직렬화 방식은 Force Text 형식으로 통일하는 것을 권장합니다.</a:t>
+              <a:t>그리고 메타 파일이 저장되는 시점은 유니티가 종료되는 시점과 프로젝트 전체를 저장하는 시점입니다.</a:t>
             </a:r>
             <a:endParaRPr lang="ko-KR" altLang="en-US" sz="1800">
               <a:latin typeface="맑은 고딕" charset="0"/>
@@ -6982,7 +6393,36 @@
       </p:sp>
       <p:pic>
         <p:nvPicPr>
-          <p:cNvPr id="1078" name="그림 7"/>
+          <p:cNvPr id="1075" name="그림 4"/>
+          <p:cNvPicPr>
+            <a:picLocks noChangeAspect="1"/>
+          </p:cNvPicPr>
+          <p:nvPr/>
+        </p:nvPicPr>
+        <p:blipFill rotWithShape="1">
+          <a:blip r:embed="rId5" cstate="print">
+            <a:extLst>
+              <a:ext uri="{28A0092B-C50C-407E-A947-70E740481C1C}">
+                <a14:useLocalDpi xmlns:a14="http://schemas.microsoft.com/office/drawing/2010/main" val="0"/>
+              </a:ext>
+            </a:extLst>
+          </a:blip>
+          <a:stretch>
+            <a:fillRect/>
+          </a:stretch>
+        </p:blipFill>
+        <p:spPr>
+          <a:xfrm rot="0">
+            <a:off x="1213485" y="2528570"/>
+            <a:ext cx="3870325" cy="1965960"/>
+          </a:xfrm>
+          <a:prstGeom prst="rect"/>
+          <a:noFill/>
+        </p:spPr>
+      </p:pic>
+      <p:pic>
+        <p:nvPicPr>
+          <p:cNvPr id="1076" name="그림 5"/>
           <p:cNvPicPr>
             <a:picLocks noChangeAspect="1"/>
           </p:cNvPicPr>
@@ -7002,8 +6442,8 @@
         </p:blipFill>
         <p:spPr>
           <a:xfrm rot="0">
-            <a:off x="1157605" y="1000125"/>
-            <a:ext cx="4434205" cy="3772535"/>
+            <a:off x="6918325" y="1257935"/>
+            <a:ext cx="1931670" cy="2419985"/>
           </a:xfrm>
           <a:prstGeom prst="rect"/>
           <a:noFill/>
@@ -7011,7 +6451,7 @@
       </p:pic>
       <p:sp>
         <p:nvSpPr>
-          <p:cNvPr id="1079" name="도형 8"/>
+          <p:cNvPr id="1077" name="도형 6"/>
           <p:cNvSpPr>
             <a:spLocks/>
           </p:cNvSpPr>
@@ -7019,8 +6459,8 @@
         </p:nvSpPr>
         <p:spPr>
           <a:xfrm rot="0">
-            <a:off x="3781425" y="1952625"/>
-            <a:ext cx="1762760" cy="200660"/>
+            <a:off x="7153275" y="2675890"/>
+            <a:ext cx="1290955" cy="191770"/>
           </a:xfrm>
           <a:prstGeom prst="rect"/>
           <a:noFill/>
@@ -7031,6 +6471,7 @@
               </a:srgbClr>
             </a:solidFill>
             <a:prstDash val="solid"/>
+            <a:miter lim="800000"/>
           </a:ln>
         </p:spPr>
         <p:style>
@@ -7050,12 +6491,15 @@
           </a:fontRef>
         </p:style>
         <p:txBody>
-          <a:bodyPr wrap="square" lIns="91440" tIns="45720" rIns="91440" bIns="45720" vert="horz" anchor="ctr">
+          <a:bodyPr wrap="square" lIns="91440" tIns="45720" rIns="91440" bIns="45720" numCol="1" vert="horz" anchor="ctr">
             <a:noAutofit/>
           </a:bodyPr>
           <a:lstStyle/>
           <a:p>
-            <a:pPr marL="0" indent="0" algn="ctr" hangingPunct="1"/>
+            <a:pPr marL="0" indent="0" algn="ctr" latinLnBrk="0" hangingPunct="1">
+              <a:buFontTx/>
+              <a:buNone/>
+            </a:pPr>
             <a:endParaRPr lang="ko-KR" altLang="en-US" sz="1800">
               <a:latin typeface="맑은 고딕" charset="0"/>
               <a:ea typeface="맑은 고딕" charset="0"/>
@@ -7065,17 +6509,17 @@
       </p:sp>
       <p:pic>
         <p:nvPicPr>
-          <p:cNvPr id="1080" name="그림 11"/>
+          <p:cNvPr id="1078" name="그림 12"/>
           <p:cNvPicPr>
             <a:picLocks noChangeAspect="1"/>
           </p:cNvPicPr>
           <p:nvPr/>
         </p:nvPicPr>
         <p:blipFill rotWithShape="1">
-          <a:blip r:embed="rId7" cstate="hqprint">
+          <a:blip r:embed="rId7" cstate="print">
             <a:extLst>
               <a:ext uri="{28A0092B-C50C-407E-A947-70E740481C1C}">
-                <a14:useLocalDpi xmlns:a14="http://schemas.microsoft.com/office/drawing/2010/main"/>
+                <a14:useLocalDpi xmlns:a14="http://schemas.microsoft.com/office/drawing/2010/main" val="0"/>
               </a:ext>
             </a:extLst>
           </a:blip>
@@ -7085,47 +6529,16 @@
         </p:blipFill>
         <p:spPr>
           <a:xfrm rot="0">
-            <a:off x="7943850" y="989330"/>
-            <a:ext cx="3249295" cy="1316990"/>
-          </a:xfrm>
-          <a:prstGeom prst="roundRect"/>
-          <a:solidFill>
-            <a:srgbClr val="EDEDED"/>
-          </a:solidFill>
+            <a:off x="9222105" y="1254125"/>
+            <a:ext cx="1935480" cy="2410460"/>
+          </a:xfrm>
+          <a:prstGeom prst="rect"/>
+          <a:noFill/>
         </p:spPr>
       </p:pic>
-      <p:pic>
-        <p:nvPicPr>
-          <p:cNvPr id="1081" name="그림 14"/>
-          <p:cNvPicPr>
-            <a:picLocks noChangeAspect="1"/>
-          </p:cNvPicPr>
-          <p:nvPr/>
-        </p:nvPicPr>
-        <p:blipFill rotWithShape="1">
-          <a:blip r:embed="rId8" cstate="hqprint">
-            <a:extLst>
-              <a:ext uri="{28A0092B-C50C-407E-A947-70E740481C1C}">
-                <a14:useLocalDpi xmlns:a14="http://schemas.microsoft.com/office/drawing/2010/main"/>
-              </a:ext>
-            </a:extLst>
-          </a:blip>
-          <a:stretch>
-            <a:fillRect/>
-          </a:stretch>
-        </p:blipFill>
-        <p:spPr>
-          <a:xfrm rot="0">
-            <a:off x="7934325" y="2400300"/>
-            <a:ext cx="3255645" cy="1172845"/>
-          </a:xfrm>
-          <a:prstGeom prst="rect"/>
-          <a:noFill/>
-        </p:spPr>
-      </p:pic>
-      <p:sp>
-        <p:nvSpPr>
-          <p:cNvPr id="1082" name="도형 15"/>
+      <p:sp>
+        <p:nvSpPr>
+          <p:cNvPr id="1079" name="도형 13"/>
           <p:cNvSpPr>
             <a:spLocks/>
           </p:cNvSpPr>
@@ -7133,10 +6546,20 @@
         </p:nvSpPr>
         <p:spPr>
           <a:xfrm rot="0">
-            <a:off x="7229475" y="1571625"/>
-            <a:ext cx="505460" cy="1743710"/>
-          </a:xfrm>
-          <a:prstGeom prst="curvedRightArrow"/>
+            <a:off x="9521825" y="1551940"/>
+            <a:ext cx="1323340" cy="189230"/>
+          </a:xfrm>
+          <a:prstGeom prst="rect"/>
+          <a:noFill/>
+          <a:ln w="12700" cap="flat" cmpd="sng">
+            <a:solidFill>
+              <a:srgbClr val="FF0000">
+                <a:alpha val="100000"/>
+              </a:srgbClr>
+            </a:solidFill>
+            <a:prstDash val="solid"/>
+            <a:miter lim="800000"/>
+          </a:ln>
         </p:spPr>
         <p:style>
           <a:lnRef idx="2">
@@ -7155,12 +6578,15 @@
           </a:fontRef>
         </p:style>
         <p:txBody>
-          <a:bodyPr wrap="square" lIns="91440" tIns="45720" rIns="91440" bIns="45720" vert="horz" anchor="ctr">
+          <a:bodyPr wrap="square" lIns="91440" tIns="45720" rIns="91440" bIns="45720" numCol="1" vert="horz" anchor="ctr">
             <a:noAutofit/>
           </a:bodyPr>
           <a:lstStyle/>
           <a:p>
-            <a:pPr marL="0" indent="0" algn="ctr" hangingPunct="1"/>
+            <a:pPr marL="0" indent="0" algn="ctr" latinLnBrk="0" hangingPunct="1">
+              <a:buFontTx/>
+              <a:buNone/>
+            </a:pPr>
             <a:endParaRPr lang="ko-KR" altLang="en-US" sz="1800">
               <a:latin typeface="맑은 고딕" charset="0"/>
               <a:ea typeface="맑은 고딕" charset="0"/>
@@ -7230,8 +6656,8 @@
         </p:blipFill>
         <p:spPr>
           <a:xfrm rot="0">
-            <a:off x="0" y="1905"/>
-            <a:ext cx="12179300" cy="6862445"/>
+            <a:off x="0" y="0"/>
+            <a:ext cx="12192635" cy="6861810"/>
           </a:xfrm>
           <a:prstGeom prst="rect"/>
           <a:noFill/>
@@ -7246,9 +6672,9 @@
           <p:nvPr/>
         </p:nvSpPr>
         <p:spPr>
-          <a:xfrm>
-            <a:off x="8160385" y="-1270"/>
-            <a:ext cx="3239770" cy="554990"/>
+          <a:xfrm rot="0">
+            <a:off x="8357235" y="-1270"/>
+            <a:ext cx="2985770" cy="554990"/>
           </a:xfrm>
           <a:prstGeom prst="rect"/>
           <a:noFill/>
@@ -7275,7 +6701,7 @@
                 <a:latin typeface="맑은 고딕" charset="0"/>
                 <a:ea typeface="맑은 고딕" charset="0"/>
               </a:rPr>
-              <a:t>meta file</a:t>
+              <a:t>Asset Packages</a:t>
             </a:r>
             <a:endParaRPr lang="ko-KR" altLang="en-US" sz="3000" b="1">
               <a:solidFill>
@@ -7296,9 +6722,9 @@
           <p:nvPr/>
         </p:nvSpPr>
         <p:spPr>
-          <a:xfrm rot="0">
-            <a:off x="1209675" y="1251585"/>
-            <a:ext cx="3883025" cy="1200785"/>
+          <a:xfrm>
+            <a:off x="1209675" y="1096645"/>
+            <a:ext cx="4401820" cy="923925"/>
           </a:xfrm>
           <a:prstGeom prst="rect"/>
           <a:noFill/>
@@ -7322,37 +6748,30 @@
                 <a:latin typeface="맑은 고딕" charset="0"/>
                 <a:ea typeface="맑은 고딕" charset="0"/>
               </a:rPr>
-              <a:t>메타 파일이</a:t>
-            </a:r>
+              <a:t>에셋 패키지란?</a:t>
+            </a:r>
+            <a:endParaRPr lang="ko-KR" altLang="en-US" sz="1800">
+              <a:latin typeface="맑은 고딕" charset="0"/>
+              <a:ea typeface="맑은 고딕" charset="0"/>
+            </a:endParaRPr>
+          </a:p>
+          <a:p>
+            <a:pPr marL="0" indent="0" algn="l" latinLnBrk="0" hangingPunct="1">
+              <a:buFontTx/>
+              <a:buNone/>
+            </a:pPr>
             <a:r>
               <a:rPr lang="ko-KR" sz="1800">
                 <a:latin typeface="맑은 고딕" charset="0"/>
                 <a:ea typeface="맑은 고딕" charset="0"/>
               </a:rPr>
-              <a:t>란?</a:t>
+              <a:t>에셋 컬렉션을 공유하고 다시 활용할 수 있는 기능입니다.</a:t>
             </a:r>
             <a:endParaRPr lang="ko-KR" altLang="en-US" sz="1800">
               <a:latin typeface="맑은 고딕" charset="0"/>
               <a:ea typeface="맑은 고딕" charset="0"/>
             </a:endParaRPr>
           </a:p>
-          <a:p>
-            <a:pPr marL="0" indent="0" algn="l" latinLnBrk="0" hangingPunct="1">
-              <a:buFontTx/>
-              <a:buNone/>
-            </a:pPr>
-            <a:r>
-              <a:rPr lang="ko-KR" sz="1800">
-                <a:latin typeface="맑은 고딕" charset="0"/>
-                <a:ea typeface="맑은 고딕" charset="0"/>
-              </a:rPr>
-              <a:t>에셋을 식별할 수 있게 하는 값이며, 그 에셋에 대한 설정 값을 저장하는 파일입니다.</a:t>
-            </a:r>
-            <a:endParaRPr lang="ko-KR" altLang="en-US" sz="1800">
-              <a:latin typeface="맑은 고딕" charset="0"/>
-              <a:ea typeface="맑은 고딕" charset="0"/>
-            </a:endParaRPr>
-          </a:p>
         </p:txBody>
       </p:sp>
       <p:sp>
@@ -7365,8 +6784,8 @@
         </p:nvSpPr>
         <p:spPr>
           <a:xfrm rot="0">
-            <a:off x="1221105" y="4763135"/>
-            <a:ext cx="3862705" cy="923925"/>
+            <a:off x="1207135" y="5233035"/>
+            <a:ext cx="4403090" cy="647065"/>
           </a:xfrm>
           <a:prstGeom prst="rect"/>
           <a:noFill/>
@@ -7390,7 +6809,7 @@
                 <a:latin typeface="맑은 고딕" charset="0"/>
                 <a:ea typeface="맑은 고딕" charset="0"/>
               </a:rPr>
-              <a:t>만약, 메타 파일이 재생성하게 되면 설정 값이 바뀌게 되면 유니티에서 참조를 잃어버리게 됩니다.</a:t>
+              <a:t>Export Package는 해당 컬렉션만 체크하여 압축하고 저장할 수 있습니다.</a:t>
             </a:r>
             <a:endParaRPr lang="ko-KR" altLang="en-US" sz="1800">
               <a:latin typeface="맑은 고딕" charset="0"/>
@@ -7409,8 +6828,8 @@
         </p:nvSpPr>
         <p:spPr>
           <a:xfrm rot="0">
-            <a:off x="6845935" y="3934460"/>
-            <a:ext cx="4307840" cy="1754505"/>
+            <a:off x="6804025" y="4950460"/>
+            <a:ext cx="4269740" cy="923925"/>
           </a:xfrm>
           <a:prstGeom prst="rect"/>
           <a:noFill/>
@@ -7434,74 +6853,18 @@
                 <a:latin typeface="맑은 고딕" charset="0"/>
                 <a:ea typeface="맑은 고딕" charset="0"/>
               </a:rPr>
-              <a:t>유니티 내부에서 설정을 변경할 때마다 메타 파일은 계속 갱신됩니다.</a:t>
+              <a:t>자신의 프로젝트 또는 다른 사람의 unity 프로젝트를 Import Package로 불러올 수 있습니다. </a:t>
             </a:r>
             <a:endParaRPr lang="ko-KR" altLang="en-US" sz="1800">
               <a:latin typeface="맑은 고딕" charset="0"/>
               <a:ea typeface="맑은 고딕" charset="0"/>
             </a:endParaRPr>
           </a:p>
-          <a:p>
-            <a:pPr marL="0" indent="0" algn="l" latinLnBrk="0" hangingPunct="1">
-              <a:buFontTx/>
-              <a:buNone/>
-            </a:pPr>
-            <a:endParaRPr lang="ko-KR" altLang="en-US" sz="1800">
-              <a:latin typeface="맑은 고딕" charset="0"/>
-              <a:ea typeface="맑은 고딕" charset="0"/>
-            </a:endParaRPr>
-          </a:p>
-          <a:p>
-            <a:pPr marL="0" indent="0" algn="l" latinLnBrk="0" hangingPunct="1">
-              <a:buFontTx/>
-              <a:buNone/>
-            </a:pPr>
-            <a:r>
-              <a:rPr lang="ko-KR" sz="1800">
-                <a:latin typeface="맑은 고딕" charset="0"/>
-                <a:ea typeface="맑은 고딕" charset="0"/>
-              </a:rPr>
-              <a:t>그리고 메타 파일이 저장되는 시점은 유니티가 종료되는 시점과 프로젝트 전체를 저장하는 시점입니다.</a:t>
-            </a:r>
-            <a:endParaRPr lang="ko-KR" altLang="en-US" sz="1800">
-              <a:latin typeface="맑은 고딕" charset="0"/>
-              <a:ea typeface="맑은 고딕" charset="0"/>
-            </a:endParaRPr>
-          </a:p>
         </p:txBody>
       </p:sp>
       <p:pic>
         <p:nvPicPr>
-          <p:cNvPr id="1075" name="그림 4"/>
-          <p:cNvPicPr>
-            <a:picLocks noChangeAspect="1"/>
-          </p:cNvPicPr>
-          <p:nvPr/>
-        </p:nvPicPr>
-        <p:blipFill rotWithShape="1">
-          <a:blip r:embed="rId5" cstate="print">
-            <a:extLst>
-              <a:ext uri="{28A0092B-C50C-407E-A947-70E740481C1C}">
-                <a14:useLocalDpi xmlns:a14="http://schemas.microsoft.com/office/drawing/2010/main" val="0"/>
-              </a:ext>
-            </a:extLst>
-          </a:blip>
-          <a:stretch>
-            <a:fillRect/>
-          </a:stretch>
-        </p:blipFill>
-        <p:spPr>
-          <a:xfrm rot="0">
-            <a:off x="1213485" y="2528570"/>
-            <a:ext cx="3870325" cy="1965960"/>
-          </a:xfrm>
-          <a:prstGeom prst="rect"/>
-          <a:noFill/>
-        </p:spPr>
-      </p:pic>
-      <p:pic>
-        <p:nvPicPr>
-          <p:cNvPr id="1076" name="그림 5"/>
+          <p:cNvPr id="1077" name="그림 1"/>
           <p:cNvPicPr>
             <a:picLocks noChangeAspect="1"/>
           </p:cNvPicPr>
@@ -7521,8 +6884,8 @@
         </p:blipFill>
         <p:spPr>
           <a:xfrm rot="0">
-            <a:off x="6918325" y="1257935"/>
-            <a:ext cx="1931670" cy="2419985"/>
+            <a:off x="1212850" y="2153285"/>
+            <a:ext cx="2030095" cy="2785110"/>
           </a:xfrm>
           <a:prstGeom prst="rect"/>
           <a:noFill/>
@@ -7530,7 +6893,7 @@
       </p:pic>
       <p:sp>
         <p:nvSpPr>
-          <p:cNvPr id="1077" name="도형 6"/>
+          <p:cNvPr id="1078" name="도형 2"/>
           <p:cNvSpPr>
             <a:spLocks/>
           </p:cNvSpPr>
@@ -7538,8 +6901,8 @@
         </p:nvSpPr>
         <p:spPr>
           <a:xfrm rot="0">
-            <a:off x="7153275" y="2675890"/>
-            <a:ext cx="1290955" cy="191770"/>
+            <a:off x="1438275" y="3491230"/>
+            <a:ext cx="923290" cy="109220"/>
           </a:xfrm>
           <a:prstGeom prst="rect"/>
           <a:noFill/>
@@ -7550,7 +6913,6 @@
               </a:srgbClr>
             </a:solidFill>
             <a:prstDash val="solid"/>
-            <a:miter lim="800000"/>
           </a:ln>
         </p:spPr>
         <p:style>
@@ -7570,15 +6932,12 @@
           </a:fontRef>
         </p:style>
         <p:txBody>
-          <a:bodyPr wrap="square" lIns="91440" tIns="45720" rIns="91440" bIns="45720" numCol="1" vert="horz" anchor="ctr">
+          <a:bodyPr wrap="square" lIns="91440" tIns="45720" rIns="91440" bIns="45720" vert="horz" anchor="ctr">
             <a:noAutofit/>
           </a:bodyPr>
           <a:lstStyle/>
           <a:p>
-            <a:pPr marL="0" indent="0" algn="ctr" latinLnBrk="0" hangingPunct="1">
-              <a:buFontTx/>
-              <a:buNone/>
-            </a:pPr>
+            <a:pPr marL="0" indent="0" algn="ctr" hangingPunct="1"/>
             <a:endParaRPr lang="ko-KR" altLang="en-US" sz="1800">
               <a:latin typeface="맑은 고딕" charset="0"/>
               <a:ea typeface="맑은 고딕" charset="0"/>
@@ -7588,7 +6947,7 @@
       </p:sp>
       <p:pic>
         <p:nvPicPr>
-          <p:cNvPr id="1078" name="그림 12"/>
+          <p:cNvPr id="1079" name="그림 5"/>
           <p:cNvPicPr>
             <a:picLocks noChangeAspect="1"/>
           </p:cNvPicPr>
@@ -7608,8 +6967,8 @@
         </p:blipFill>
         <p:spPr>
           <a:xfrm rot="0">
-            <a:off x="9222105" y="1254125"/>
-            <a:ext cx="1935480" cy="2410460"/>
+            <a:off x="3699510" y="2145030"/>
+            <a:ext cx="1912620" cy="2768600"/>
           </a:xfrm>
           <a:prstGeom prst="rect"/>
           <a:noFill/>
@@ -7617,7 +6976,7 @@
       </p:pic>
       <p:sp>
         <p:nvSpPr>
-          <p:cNvPr id="1079" name="도형 13"/>
+          <p:cNvPr id="1080" name="도형 6"/>
           <p:cNvSpPr>
             <a:spLocks/>
           </p:cNvSpPr>
@@ -7625,8 +6984,8 @@
         </p:nvSpPr>
         <p:spPr>
           <a:xfrm rot="0">
-            <a:off x="9521825" y="1551940"/>
-            <a:ext cx="1323340" cy="189230"/>
+            <a:off x="5245735" y="4572000"/>
+            <a:ext cx="332740" cy="108585"/>
           </a:xfrm>
           <a:prstGeom prst="rect"/>
           <a:noFill/>
@@ -7637,7 +6996,6 @@
               </a:srgbClr>
             </a:solidFill>
             <a:prstDash val="solid"/>
-            <a:miter lim="800000"/>
           </a:ln>
         </p:spPr>
         <p:style>
@@ -7657,15 +7015,12 @@
           </a:fontRef>
         </p:style>
         <p:txBody>
-          <a:bodyPr wrap="square" lIns="91440" tIns="45720" rIns="91440" bIns="45720" numCol="1" vert="horz" anchor="ctr">
+          <a:bodyPr wrap="square" lIns="91440" tIns="45720" rIns="91440" bIns="45720" vert="horz" anchor="ctr">
             <a:noAutofit/>
           </a:bodyPr>
           <a:lstStyle/>
           <a:p>
-            <a:pPr marL="0" indent="0" algn="ctr" latinLnBrk="0" hangingPunct="1">
-              <a:buFontTx/>
-              <a:buNone/>
-            </a:pPr>
+            <a:pPr marL="0" indent="0" algn="ctr" hangingPunct="1"/>
             <a:endParaRPr lang="ko-KR" altLang="en-US" sz="1800">
               <a:latin typeface="맑은 고딕" charset="0"/>
               <a:ea typeface="맑은 고딕" charset="0"/>
@@ -7673,6 +7028,147 @@
           </a:p>
         </p:txBody>
       </p:sp>
+      <p:pic>
+        <p:nvPicPr>
+          <p:cNvPr id="1081" name="그림 7"/>
+          <p:cNvPicPr>
+            <a:picLocks noChangeAspect="1"/>
+          </p:cNvPicPr>
+          <p:nvPr/>
+        </p:nvPicPr>
+        <p:blipFill rotWithShape="1">
+          <a:blip r:embed="rId8" cstate="print">
+            <a:extLst>
+              <a:ext uri="{28A0092B-C50C-407E-A947-70E740481C1C}">
+                <a14:useLocalDpi xmlns:a14="http://schemas.microsoft.com/office/drawing/2010/main" val="0"/>
+              </a:ext>
+            </a:extLst>
+          </a:blip>
+          <a:stretch>
+            <a:fillRect/>
+          </a:stretch>
+        </p:blipFill>
+        <p:spPr>
+          <a:xfrm rot="0">
+            <a:off x="6821170" y="1089025"/>
+            <a:ext cx="2030095" cy="2103755"/>
+          </a:xfrm>
+          <a:prstGeom prst="rect"/>
+          <a:noFill/>
+        </p:spPr>
+      </p:pic>
+      <p:sp>
+        <p:nvSpPr>
+          <p:cNvPr id="1082" name="도형 8"/>
+          <p:cNvSpPr>
+            <a:spLocks/>
+          </p:cNvSpPr>
+          <p:nvPr/>
+        </p:nvSpPr>
+        <p:spPr>
+          <a:xfrm rot="0">
+            <a:off x="7030085" y="1995170"/>
+            <a:ext cx="923290" cy="108585"/>
+          </a:xfrm>
+          <a:prstGeom prst="rect"/>
+          <a:noFill/>
+          <a:ln w="12700" cap="flat" cmpd="sng">
+            <a:solidFill>
+              <a:srgbClr val="FF0000">
+                <a:alpha val="100000"/>
+              </a:srgbClr>
+            </a:solidFill>
+            <a:prstDash val="solid"/>
+          </a:ln>
+        </p:spPr>
+        <p:style>
+          <a:lnRef idx="2">
+            <a:schemeClr val="accent1">
+              <a:shade val="50000"/>
+            </a:schemeClr>
+          </a:lnRef>
+          <a:fillRef idx="1">
+            <a:schemeClr val="accent1"/>
+          </a:fillRef>
+          <a:effectRef idx="0">
+            <a:schemeClr val="accent1"/>
+          </a:effectRef>
+          <a:fontRef idx="minor">
+            <a:schemeClr val="lt1"/>
+          </a:fontRef>
+        </p:style>
+        <p:txBody>
+          <a:bodyPr wrap="square" lIns="91440" tIns="45720" rIns="91440" bIns="45720" vert="horz" anchor="ctr">
+            <a:noAutofit/>
+          </a:bodyPr>
+          <a:lstStyle/>
+          <a:p>
+            <a:pPr marL="0" indent="0" algn="ctr" hangingPunct="1"/>
+            <a:endParaRPr lang="ko-KR" altLang="en-US" sz="1800">
+              <a:latin typeface="맑은 고딕" charset="0"/>
+              <a:ea typeface="맑은 고딕" charset="0"/>
+            </a:endParaRPr>
+          </a:p>
+        </p:txBody>
+      </p:sp>
+      <p:pic>
+        <p:nvPicPr>
+          <p:cNvPr id="1083" name="그림 9"/>
+          <p:cNvPicPr>
+            <a:picLocks noChangeAspect="1"/>
+          </p:cNvPicPr>
+          <p:nvPr/>
+        </p:nvPicPr>
+        <p:blipFill rotWithShape="1">
+          <a:blip r:embed="rId9" cstate="print">
+            <a:extLst>
+              <a:ext uri="{28A0092B-C50C-407E-A947-70E740481C1C}">
+                <a14:useLocalDpi xmlns:a14="http://schemas.microsoft.com/office/drawing/2010/main" val="0"/>
+              </a:ext>
+            </a:extLst>
+          </a:blip>
+          <a:stretch>
+            <a:fillRect/>
+          </a:stretch>
+        </p:blipFill>
+        <p:spPr>
+          <a:xfrm rot="0">
+            <a:off x="9493885" y="1304925"/>
+            <a:ext cx="1571625" cy="1688465"/>
+          </a:xfrm>
+          <a:prstGeom prst="rect"/>
+          <a:noFill/>
+        </p:spPr>
+      </p:pic>
+      <p:pic>
+        <p:nvPicPr>
+          <p:cNvPr id="1084" name="그림 10"/>
+          <p:cNvPicPr>
+            <a:picLocks noChangeAspect="1"/>
+          </p:cNvPicPr>
+          <p:nvPr/>
+        </p:nvPicPr>
+        <p:blipFill rotWithShape="1">
+          <a:blip r:embed="rId10" cstate="print">
+            <a:extLst>
+              <a:ext uri="{28A0092B-C50C-407E-A947-70E740481C1C}">
+                <a14:useLocalDpi xmlns:a14="http://schemas.microsoft.com/office/drawing/2010/main" val="0"/>
+              </a:ext>
+            </a:extLst>
+          </a:blip>
+          <a:stretch>
+            <a:fillRect/>
+          </a:stretch>
+        </p:blipFill>
+        <p:spPr>
+          <a:xfrm rot="0">
+            <a:off x="6824980" y="3374390"/>
+            <a:ext cx="4248785" cy="1472565"/>
+          </a:xfrm>
+          <a:prstGeom prst="rect"/>
+          <a:noFill/>
+        </p:spPr>
+      </p:pic>
     </p:spTree>
   </p:cSld>
   <p:clrMapOvr>
@@ -7736,7 +7232,7 @@
         <p:spPr>
           <a:xfrm rot="0">
             <a:off x="0" y="0"/>
-            <a:ext cx="12192635" cy="6861810"/>
+            <a:ext cx="12192635" cy="6862445"/>
           </a:xfrm>
           <a:prstGeom prst="rect"/>
           <a:noFill/>
@@ -7752,8 +7248,8 @@
         </p:nvSpPr>
         <p:spPr>
           <a:xfrm rot="0">
-            <a:off x="8357235" y="-1270"/>
-            <a:ext cx="2985770" cy="554990"/>
+            <a:off x="9143365" y="-1270"/>
+            <a:ext cx="1281430" cy="554990"/>
           </a:xfrm>
           <a:prstGeom prst="rect"/>
           <a:noFill/>
@@ -7780,7 +7276,7 @@
                 <a:latin typeface="맑은 고딕" charset="0"/>
                 <a:ea typeface="맑은 고딕" charset="0"/>
               </a:rPr>
-              <a:t>Asset Packages</a:t>
+              <a:t>Script</a:t>
             </a:r>
             <a:endParaRPr lang="ko-KR" altLang="en-US" sz="3000" b="1">
               <a:solidFill>
@@ -7803,7 +7299,7 @@
         <p:spPr>
           <a:xfrm>
             <a:off x="1209675" y="1096645"/>
-            <a:ext cx="4401820" cy="923925"/>
+            <a:ext cx="4402455" cy="923925"/>
           </a:xfrm>
           <a:prstGeom prst="rect"/>
           <a:noFill/>
@@ -7827,7 +7323,7 @@
                 <a:latin typeface="맑은 고딕" charset="0"/>
                 <a:ea typeface="맑은 고딕" charset="0"/>
               </a:rPr>
-              <a:t>에셋 패키지란?</a:t>
+              <a:t>스크립트란?</a:t>
             </a:r>
             <a:endParaRPr lang="ko-KR" altLang="en-US" sz="1800">
               <a:latin typeface="맑은 고딕" charset="0"/>
@@ -7844,7 +7340,7 @@
                 <a:latin typeface="맑은 고딕" charset="0"/>
                 <a:ea typeface="맑은 고딕" charset="0"/>
               </a:rPr>
-              <a:t>에셋 컬렉션을 공유하고 다시 활용할 수 있는 기능입니다.</a:t>
+              <a:t>게임 오브젝트의 행동이나 관리를 할 수 있도록 제어하는 코드입니다.</a:t>
             </a:r>
             <a:endParaRPr lang="ko-KR" altLang="en-US" sz="1800">
               <a:latin typeface="맑은 고딕" charset="0"/>
@@ -7863,8 +7359,8 @@
         </p:nvSpPr>
         <p:spPr>
           <a:xfrm rot="0">
-            <a:off x="1207135" y="5233035"/>
-            <a:ext cx="4403090" cy="647065"/>
+            <a:off x="1207135" y="5028565"/>
+            <a:ext cx="4401820" cy="647065"/>
           </a:xfrm>
           <a:prstGeom prst="rect"/>
           <a:noFill/>
@@ -7888,7 +7384,14 @@
                 <a:latin typeface="맑은 고딕" charset="0"/>
                 <a:ea typeface="맑은 고딕" charset="0"/>
               </a:rPr>
-              <a:t>Export Package는 해당 컬렉션만 체크하여 압축하고 저장할 수 있습니다.</a:t>
+              <a:t>모든 스크립트는 기본적으로 MonoBehaviour를 상속받고 있습니다.</a:t>
+            </a:r>
+            <a:r>
+              <a:rPr lang="ko-KR" sz="1800">
+                <a:latin typeface="맑은 고딕" charset="0"/>
+                <a:ea typeface="맑은 고딕" charset="0"/>
+              </a:rPr>
+              <a:t> </a:t>
             </a:r>
             <a:endParaRPr lang="ko-KR" altLang="en-US" sz="1800">
               <a:latin typeface="맑은 고딕" charset="0"/>
@@ -7899,7 +7402,7 @@
       </p:sp>
       <p:sp>
         <p:nvSpPr>
-          <p:cNvPr id="1066" name="Rect 0"/>
+          <p:cNvPr id="1091" name="텍스트 상자 22"/>
           <p:cNvSpPr txBox="1">
             <a:spLocks/>
           </p:cNvSpPr>
@@ -7907,8 +7410,8 @@
         </p:nvSpPr>
         <p:spPr>
           <a:xfrm rot="0">
-            <a:off x="6804025" y="4950460"/>
-            <a:ext cx="4269740" cy="923925"/>
+            <a:off x="6932295" y="4751070"/>
+            <a:ext cx="4423410" cy="923925"/>
           </a:xfrm>
           <a:prstGeom prst="rect"/>
           <a:noFill/>
@@ -7932,18 +7435,64 @@
                 <a:latin typeface="맑은 고딕" charset="0"/>
                 <a:ea typeface="맑은 고딕" charset="0"/>
               </a:rPr>
-              <a:t>자신의 프로젝트 또는 다른 사람의 unity 프로젝트를 Import Package로 불러올 수 있습니다. </a:t>
+              <a:t>- 스크립트 인스턴스화</a:t>
             </a:r>
             <a:endParaRPr lang="ko-KR" altLang="en-US" sz="1800">
               <a:latin typeface="맑은 고딕" charset="0"/>
               <a:ea typeface="맑은 고딕" charset="0"/>
             </a:endParaRPr>
           </a:p>
+          <a:p>
+            <a:pPr marL="0" indent="0" algn="l" latinLnBrk="0" hangingPunct="1">
+              <a:buFontTx/>
+              <a:buNone/>
+            </a:pPr>
+            <a:r>
+              <a:rPr lang="ko-KR" sz="1800">
+                <a:latin typeface="맑은 고딕" charset="0"/>
+                <a:ea typeface="맑은 고딕" charset="0"/>
+              </a:rPr>
+              <a:t>게임 오브젝트에 스크립트를 부착하여 동작을 수행하도록 하는 것입니다.</a:t>
+            </a:r>
+            <a:endParaRPr lang="ko-KR" altLang="en-US" sz="1800">
+              <a:latin typeface="맑은 고딕" charset="0"/>
+              <a:ea typeface="맑은 고딕" charset="0"/>
+            </a:endParaRPr>
+          </a:p>
         </p:txBody>
       </p:sp>
       <p:pic>
         <p:nvPicPr>
-          <p:cNvPr id="1077" name="그림 1"/>
+          <p:cNvPr id="1092" name="그림 1"/>
+          <p:cNvPicPr>
+            <a:picLocks noChangeAspect="1"/>
+          </p:cNvPicPr>
+          <p:nvPr/>
+        </p:nvPicPr>
+        <p:blipFill rotWithShape="1">
+          <a:blip r:embed="rId5" cstate="print">
+            <a:extLst>
+              <a:ext uri="{28A0092B-C50C-407E-A947-70E740481C1C}">
+                <a14:useLocalDpi xmlns:a14="http://schemas.microsoft.com/office/drawing/2010/main" val="0"/>
+              </a:ext>
+            </a:extLst>
+          </a:blip>
+          <a:stretch>
+            <a:fillRect/>
+          </a:stretch>
+        </p:blipFill>
+        <p:spPr>
+          <a:xfrm rot="0">
+            <a:off x="6981825" y="1103630"/>
+            <a:ext cx="4438015" cy="1669415"/>
+          </a:xfrm>
+          <a:prstGeom prst="rect"/>
+          <a:noFill/>
+        </p:spPr>
+      </p:pic>
+      <p:pic>
+        <p:nvPicPr>
+          <p:cNvPr id="1093" name="그림 4"/>
           <p:cNvPicPr>
             <a:picLocks noChangeAspect="1"/>
           </p:cNvPicPr>
@@ -7963,8 +7512,8 @@
         </p:blipFill>
         <p:spPr>
           <a:xfrm rot="0">
-            <a:off x="1212850" y="2153285"/>
-            <a:ext cx="2030095" cy="2785110"/>
+            <a:off x="1202690" y="2348865"/>
+            <a:ext cx="2099945" cy="2551430"/>
           </a:xfrm>
           <a:prstGeom prst="rect"/>
           <a:noFill/>
@@ -7972,7 +7521,7 @@
       </p:pic>
       <p:sp>
         <p:nvSpPr>
-          <p:cNvPr id="1078" name="도형 2"/>
+          <p:cNvPr id="1094" name="도형 5"/>
           <p:cNvSpPr>
             <a:spLocks/>
           </p:cNvSpPr>
@@ -7980,8 +7529,8 @@
         </p:nvSpPr>
         <p:spPr>
           <a:xfrm rot="0">
-            <a:off x="1438275" y="3491230"/>
-            <a:ext cx="923290" cy="109220"/>
+            <a:off x="1418590" y="2772410"/>
+            <a:ext cx="953135" cy="222885"/>
           </a:xfrm>
           <a:prstGeom prst="rect"/>
           <a:noFill/>
@@ -8026,7 +7575,7 @@
       </p:sp>
       <p:pic>
         <p:nvPicPr>
-          <p:cNvPr id="1079" name="그림 5"/>
+          <p:cNvPr id="1095" name="그림 8"/>
           <p:cNvPicPr>
             <a:picLocks noChangeAspect="1"/>
           </p:cNvPicPr>
@@ -8046,70 +7595,16 @@
         </p:blipFill>
         <p:spPr>
           <a:xfrm rot="0">
-            <a:off x="3699510" y="2145030"/>
-            <a:ext cx="1912620" cy="2768600"/>
+            <a:off x="6921500" y="2984500"/>
+            <a:ext cx="4434840" cy="1651000"/>
           </a:xfrm>
           <a:prstGeom prst="rect"/>
           <a:noFill/>
         </p:spPr>
       </p:pic>
-      <p:sp>
-        <p:nvSpPr>
-          <p:cNvPr id="1080" name="도형 6"/>
-          <p:cNvSpPr>
-            <a:spLocks/>
-          </p:cNvSpPr>
-          <p:nvPr/>
-        </p:nvSpPr>
-        <p:spPr>
-          <a:xfrm rot="0">
-            <a:off x="5245735" y="4572000"/>
-            <a:ext cx="332740" cy="108585"/>
-          </a:xfrm>
-          <a:prstGeom prst="rect"/>
-          <a:noFill/>
-          <a:ln w="12700" cap="flat" cmpd="sng">
-            <a:solidFill>
-              <a:srgbClr val="FF0000">
-                <a:alpha val="100000"/>
-              </a:srgbClr>
-            </a:solidFill>
-            <a:prstDash val="solid"/>
-          </a:ln>
-        </p:spPr>
-        <p:style>
-          <a:lnRef idx="2">
-            <a:schemeClr val="accent1">
-              <a:shade val="50000"/>
-            </a:schemeClr>
-          </a:lnRef>
-          <a:fillRef idx="1">
-            <a:schemeClr val="accent1"/>
-          </a:fillRef>
-          <a:effectRef idx="0">
-            <a:schemeClr val="accent1"/>
-          </a:effectRef>
-          <a:fontRef idx="minor">
-            <a:schemeClr val="lt1"/>
-          </a:fontRef>
-        </p:style>
-        <p:txBody>
-          <a:bodyPr wrap="square" lIns="91440" tIns="45720" rIns="91440" bIns="45720" vert="horz" anchor="ctr">
-            <a:noAutofit/>
-          </a:bodyPr>
-          <a:lstStyle/>
-          <a:p>
-            <a:pPr marL="0" indent="0" algn="ctr" hangingPunct="1"/>
-            <a:endParaRPr lang="ko-KR" altLang="en-US" sz="1800">
-              <a:latin typeface="맑은 고딕" charset="0"/>
-              <a:ea typeface="맑은 고딕" charset="0"/>
-            </a:endParaRPr>
-          </a:p>
-        </p:txBody>
-      </p:sp>
       <p:pic>
         <p:nvPicPr>
-          <p:cNvPr id="1081" name="그림 7"/>
+          <p:cNvPr id="1096" name="그림 9"/>
           <p:cNvPicPr>
             <a:picLocks noChangeAspect="1"/>
           </p:cNvPicPr>
@@ -8129,120 +7624,8 @@
         </p:blipFill>
         <p:spPr>
           <a:xfrm rot="0">
-            <a:off x="6821170" y="1089025"/>
-            <a:ext cx="2030095" cy="2103755"/>
-          </a:xfrm>
-          <a:prstGeom prst="rect"/>
-          <a:noFill/>
-        </p:spPr>
-      </p:pic>
-      <p:sp>
-        <p:nvSpPr>
-          <p:cNvPr id="1082" name="도형 8"/>
-          <p:cNvSpPr>
-            <a:spLocks/>
-          </p:cNvSpPr>
-          <p:nvPr/>
-        </p:nvSpPr>
-        <p:spPr>
-          <a:xfrm rot="0">
-            <a:off x="7030085" y="1995170"/>
-            <a:ext cx="923290" cy="108585"/>
-          </a:xfrm>
-          <a:prstGeom prst="rect"/>
-          <a:noFill/>
-          <a:ln w="12700" cap="flat" cmpd="sng">
-            <a:solidFill>
-              <a:srgbClr val="FF0000">
-                <a:alpha val="100000"/>
-              </a:srgbClr>
-            </a:solidFill>
-            <a:prstDash val="solid"/>
-          </a:ln>
-        </p:spPr>
-        <p:style>
-          <a:lnRef idx="2">
-            <a:schemeClr val="accent1">
-              <a:shade val="50000"/>
-            </a:schemeClr>
-          </a:lnRef>
-          <a:fillRef idx="1">
-            <a:schemeClr val="accent1"/>
-          </a:fillRef>
-          <a:effectRef idx="0">
-            <a:schemeClr val="accent1"/>
-          </a:effectRef>
-          <a:fontRef idx="minor">
-            <a:schemeClr val="lt1"/>
-          </a:fontRef>
-        </p:style>
-        <p:txBody>
-          <a:bodyPr wrap="square" lIns="91440" tIns="45720" rIns="91440" bIns="45720" vert="horz" anchor="ctr">
-            <a:noAutofit/>
-          </a:bodyPr>
-          <a:lstStyle/>
-          <a:p>
-            <a:pPr marL="0" indent="0" algn="ctr" hangingPunct="1"/>
-            <a:endParaRPr lang="ko-KR" altLang="en-US" sz="1800">
-              <a:latin typeface="맑은 고딕" charset="0"/>
-              <a:ea typeface="맑은 고딕" charset="0"/>
-            </a:endParaRPr>
-          </a:p>
-        </p:txBody>
-      </p:sp>
-      <p:pic>
-        <p:nvPicPr>
-          <p:cNvPr id="1083" name="그림 9"/>
-          <p:cNvPicPr>
-            <a:picLocks noChangeAspect="1"/>
-          </p:cNvPicPr>
-          <p:nvPr/>
-        </p:nvPicPr>
-        <p:blipFill rotWithShape="1">
-          <a:blip r:embed="rId9" cstate="print">
-            <a:extLst>
-              <a:ext uri="{28A0092B-C50C-407E-A947-70E740481C1C}">
-                <a14:useLocalDpi xmlns:a14="http://schemas.microsoft.com/office/drawing/2010/main" val="0"/>
-              </a:ext>
-            </a:extLst>
-          </a:blip>
-          <a:stretch>
-            <a:fillRect/>
-          </a:stretch>
-        </p:blipFill>
-        <p:spPr>
-          <a:xfrm rot="0">
-            <a:off x="9493885" y="1304925"/>
-            <a:ext cx="1571625" cy="1688465"/>
-          </a:xfrm>
-          <a:prstGeom prst="rect"/>
-          <a:noFill/>
-        </p:spPr>
-      </p:pic>
-      <p:pic>
-        <p:nvPicPr>
-          <p:cNvPr id="1084" name="그림 10"/>
-          <p:cNvPicPr>
-            <a:picLocks noChangeAspect="1"/>
-          </p:cNvPicPr>
-          <p:nvPr/>
-        </p:nvPicPr>
-        <p:blipFill rotWithShape="1">
-          <a:blip r:embed="rId10" cstate="print">
-            <a:extLst>
-              <a:ext uri="{28A0092B-C50C-407E-A947-70E740481C1C}">
-                <a14:useLocalDpi xmlns:a14="http://schemas.microsoft.com/office/drawing/2010/main" val="0"/>
-              </a:ext>
-            </a:extLst>
-          </a:blip>
-          <a:stretch>
-            <a:fillRect/>
-          </a:stretch>
-        </p:blipFill>
-        <p:spPr>
-          <a:xfrm rot="0">
-            <a:off x="6824980" y="3374390"/>
-            <a:ext cx="4248785" cy="1472565"/>
+            <a:off x="3524250" y="2348865"/>
+            <a:ext cx="2075180" cy="2562225"/>
           </a:xfrm>
           <a:prstGeom prst="rect"/>
           <a:noFill/>
@@ -8310,8 +7693,8 @@
         </p:blipFill>
         <p:spPr>
           <a:xfrm rot="0">
-            <a:off x="0" y="0"/>
-            <a:ext cx="12192635" cy="6862445"/>
+            <a:off x="30480" y="0"/>
+            <a:ext cx="12162155" cy="6863080"/>
           </a:xfrm>
           <a:prstGeom prst="rect"/>
           <a:noFill/>
@@ -8327,8 +7710,8 @@
         </p:nvSpPr>
         <p:spPr>
           <a:xfrm rot="0">
-            <a:off x="9143365" y="-1270"/>
-            <a:ext cx="1281430" cy="554990"/>
+            <a:off x="7926070" y="-1270"/>
+            <a:ext cx="3644900" cy="554990"/>
           </a:xfrm>
           <a:prstGeom prst="rect"/>
           <a:noFill/>
@@ -8355,7 +7738,7 @@
                 <a:latin typeface="맑은 고딕" charset="0"/>
                 <a:ea typeface="맑은 고딕" charset="0"/>
               </a:rPr>
-              <a:t>Script</a:t>
+              <a:t>Coordinate System</a:t>
             </a:r>
             <a:endParaRPr lang="ko-KR" altLang="en-US" sz="3000" b="1">
               <a:solidFill>
@@ -8376,9 +7759,9 @@
           <p:nvPr/>
         </p:nvSpPr>
         <p:spPr>
-          <a:xfrm>
+          <a:xfrm rot="0">
             <a:off x="1209675" y="1096645"/>
-            <a:ext cx="4402455" cy="923925"/>
+            <a:ext cx="4427220" cy="923925"/>
           </a:xfrm>
           <a:prstGeom prst="rect"/>
           <a:noFill/>
@@ -8402,7 +7785,7 @@
                 <a:latin typeface="맑은 고딕" charset="0"/>
                 <a:ea typeface="맑은 고딕" charset="0"/>
               </a:rPr>
-              <a:t>스크립트란?</a:t>
+              <a:t>유니티 좌표계는 왼손 좌표계를 사용하며 </a:t>
             </a:r>
             <a:endParaRPr lang="ko-KR" altLang="en-US" sz="1800">
               <a:latin typeface="맑은 고딕" charset="0"/>
@@ -8419,7 +7802,7 @@
                 <a:latin typeface="맑은 고딕" charset="0"/>
                 <a:ea typeface="맑은 고딕" charset="0"/>
               </a:rPr>
-              <a:t>게임 오브젝트의 행동이나 관리를 할 수 있도록 제어하는 코드입니다.</a:t>
+              <a:t>엄지를 x축 방향, 검지를 y축 방향, 중지를 z축 방향으로 표시합니다. </a:t>
             </a:r>
             <a:endParaRPr lang="ko-KR" altLang="en-US" sz="1800">
               <a:latin typeface="맑은 고딕" charset="0"/>
@@ -8438,8 +7821,8 @@
         </p:nvSpPr>
         <p:spPr>
           <a:xfrm rot="0">
-            <a:off x="1207135" y="5028565"/>
-            <a:ext cx="4401820" cy="647065"/>
+            <a:off x="1207135" y="4753610"/>
+            <a:ext cx="4429760" cy="923925"/>
           </a:xfrm>
           <a:prstGeom prst="rect"/>
           <a:noFill/>
@@ -8463,14 +7846,7 @@
                 <a:latin typeface="맑은 고딕" charset="0"/>
                 <a:ea typeface="맑은 고딕" charset="0"/>
               </a:rPr>
-              <a:t>모든 스크립트는 기본적으로 MonoBehaviour를 상속받고 있습니다.</a:t>
-            </a:r>
-            <a:r>
-              <a:rPr lang="ko-KR" sz="1800">
-                <a:latin typeface="맑은 고딕" charset="0"/>
-                <a:ea typeface="맑은 고딕" charset="0"/>
-              </a:rPr>
-              <a:t> </a:t>
+              <a:t>왼손 좌표계는 화면을 바라보는 사람에게서 화면 방향으로 z축을 가리키게 됩니다.</a:t>
             </a:r>
             <a:endParaRPr lang="ko-KR" altLang="en-US" sz="1800">
               <a:latin typeface="맑은 고딕" charset="0"/>
@@ -8481,7 +7857,7 @@
       </p:sp>
       <p:sp>
         <p:nvSpPr>
-          <p:cNvPr id="1091" name="텍스트 상자 22"/>
+          <p:cNvPr id="1091" name="Rect 0"/>
           <p:cNvSpPr txBox="1">
             <a:spLocks/>
           </p:cNvSpPr>
@@ -8490,7 +7866,7 @@
         <p:spPr>
           <a:xfrm rot="0">
             <a:off x="6932295" y="4751070"/>
-            <a:ext cx="4423410" cy="923925"/>
+            <a:ext cx="4199255" cy="923925"/>
           </a:xfrm>
           <a:prstGeom prst="rect"/>
           <a:noFill/>
@@ -8514,35 +7890,78 @@
                 <a:latin typeface="맑은 고딕" charset="0"/>
                 <a:ea typeface="맑은 고딕" charset="0"/>
               </a:rPr>
-              <a:t>- 스크립트 인스턴스화</a:t>
+              <a:t>오브젝트의 위치를 나타내는 좌표계로, 화면의 중심을 원점으로 (0, 0, 0)로 하는 3차원 좌표계입니다.</a:t>
             </a:r>
             <a:endParaRPr lang="ko-KR" altLang="en-US" sz="1800">
               <a:latin typeface="맑은 고딕" charset="0"/>
               <a:ea typeface="맑은 고딕" charset="0"/>
             </a:endParaRPr>
           </a:p>
-          <a:p>
-            <a:pPr marL="0" indent="0" algn="l" latinLnBrk="0" hangingPunct="1">
-              <a:buFontTx/>
-              <a:buNone/>
-            </a:pPr>
-            <a:r>
-              <a:rPr lang="ko-KR" sz="1800">
-                <a:latin typeface="맑은 고딕" charset="0"/>
-                <a:ea typeface="맑은 고딕" charset="0"/>
-              </a:rPr>
-              <a:t>게임 오브젝트에 스크립트를 부착하여 동작을 수행하도록 하는 것입니다.</a:t>
-            </a:r>
-            <a:endParaRPr lang="ko-KR" altLang="en-US" sz="1800">
-              <a:latin typeface="맑은 고딕" charset="0"/>
-              <a:ea typeface="맑은 고딕" charset="0"/>
-            </a:endParaRPr>
-          </a:p>
         </p:txBody>
       </p:sp>
       <p:pic>
         <p:nvPicPr>
-          <p:cNvPr id="1092" name="그림 1"/>
+          <p:cNvPr id="1097" name="그림 2"/>
+          <p:cNvPicPr>
+            <a:picLocks noChangeAspect="1"/>
+          </p:cNvPicPr>
+          <p:nvPr/>
+        </p:nvPicPr>
+        <p:blipFill rotWithShape="1">
+          <a:blip r:embed="rId3" cstate="print">
+            <a:extLst>
+              <a:ext uri="{28A0092B-C50C-407E-A947-70E740481C1C}">
+                <a14:useLocalDpi xmlns:a14="http://schemas.microsoft.com/office/drawing/2010/main" val="0"/>
+              </a:ext>
+            </a:extLst>
+          </a:blip>
+          <a:stretch>
+            <a:fillRect/>
+          </a:stretch>
+        </p:blipFill>
+        <p:spPr>
+          <a:xfrm rot="0">
+            <a:off x="1234440" y="2295525"/>
+            <a:ext cx="1935480" cy="2240280"/>
+          </a:xfrm>
+          <a:prstGeom prst="rect"/>
+          <a:noFill/>
+        </p:spPr>
+      </p:pic>
+      <p:pic>
+        <p:nvPicPr>
+          <p:cNvPr id="1098" name="그림 3" descr="C:/Users/Admin1/AppData/Roaming/PolarisOffice/ETemp/9284_9875952/fImage60681918467.png"/>
+          <p:cNvPicPr>
+            <a:picLocks noChangeAspect="1"/>
+          </p:cNvPicPr>
+          <p:nvPr/>
+        </p:nvPicPr>
+        <p:blipFill rotWithShape="1">
+          <a:blip r:embed="rId4" cstate="hqprint">
+            <a:extLst>
+              <a:ext uri="{28A0092B-C50C-407E-A947-70E740481C1C}">
+                <a14:useLocalDpi xmlns:a14="http://schemas.microsoft.com/office/drawing/2010/main"/>
+              </a:ext>
+            </a:extLst>
+          </a:blip>
+          <a:stretch>
+            <a:fillRect/>
+          </a:stretch>
+        </p:blipFill>
+        <p:spPr>
+          <a:xfrm rot="0">
+            <a:off x="6932930" y="1094105"/>
+            <a:ext cx="4208145" cy="1683385"/>
+          </a:xfrm>
+          <a:prstGeom prst="roundRect"/>
+          <a:solidFill>
+            <a:srgbClr val="EDEDED"/>
+          </a:solidFill>
+        </p:spPr>
+      </p:pic>
+      <p:pic>
+        <p:nvPicPr>
+          <p:cNvPr id="1099" name="그림 4"/>
           <p:cNvPicPr>
             <a:picLocks noChangeAspect="1"/>
           </p:cNvPicPr>
@@ -8562,8 +7981,8 @@
         </p:blipFill>
         <p:spPr>
           <a:xfrm rot="0">
-            <a:off x="6981825" y="1103630"/>
-            <a:ext cx="4438015" cy="1669415"/>
+            <a:off x="3556000" y="2277110"/>
+            <a:ext cx="2047875" cy="2276475"/>
           </a:xfrm>
           <a:prstGeom prst="rect"/>
           <a:noFill/>
@@ -8571,7 +7990,7 @@
       </p:pic>
       <p:pic>
         <p:nvPicPr>
-          <p:cNvPr id="1093" name="그림 4"/>
+          <p:cNvPr id="1100" name="그림 5"/>
           <p:cNvPicPr>
             <a:picLocks noChangeAspect="1"/>
           </p:cNvPicPr>
@@ -8591,120 +8010,8 @@
         </p:blipFill>
         <p:spPr>
           <a:xfrm rot="0">
-            <a:off x="1202690" y="2348865"/>
-            <a:ext cx="2099945" cy="2551430"/>
-          </a:xfrm>
-          <a:prstGeom prst="rect"/>
-          <a:noFill/>
-        </p:spPr>
-      </p:pic>
-      <p:sp>
-        <p:nvSpPr>
-          <p:cNvPr id="1094" name="도형 5"/>
-          <p:cNvSpPr>
-            <a:spLocks/>
-          </p:cNvSpPr>
-          <p:nvPr/>
-        </p:nvSpPr>
-        <p:spPr>
-          <a:xfrm rot="0">
-            <a:off x="1418590" y="2772410"/>
-            <a:ext cx="953135" cy="222885"/>
-          </a:xfrm>
-          <a:prstGeom prst="rect"/>
-          <a:noFill/>
-          <a:ln w="12700" cap="flat" cmpd="sng">
-            <a:solidFill>
-              <a:srgbClr val="FF0000">
-                <a:alpha val="100000"/>
-              </a:srgbClr>
-            </a:solidFill>
-            <a:prstDash val="solid"/>
-          </a:ln>
-        </p:spPr>
-        <p:style>
-          <a:lnRef idx="2">
-            <a:schemeClr val="accent1">
-              <a:shade val="50000"/>
-            </a:schemeClr>
-          </a:lnRef>
-          <a:fillRef idx="1">
-            <a:schemeClr val="accent1"/>
-          </a:fillRef>
-          <a:effectRef idx="0">
-            <a:schemeClr val="accent1"/>
-          </a:effectRef>
-          <a:fontRef idx="minor">
-            <a:schemeClr val="lt1"/>
-          </a:fontRef>
-        </p:style>
-        <p:txBody>
-          <a:bodyPr wrap="square" lIns="91440" tIns="45720" rIns="91440" bIns="45720" vert="horz" anchor="ctr">
-            <a:noAutofit/>
-          </a:bodyPr>
-          <a:lstStyle/>
-          <a:p>
-            <a:pPr marL="0" indent="0" algn="ctr" hangingPunct="1"/>
-            <a:endParaRPr lang="ko-KR" altLang="en-US" sz="1800">
-              <a:latin typeface="맑은 고딕" charset="0"/>
-              <a:ea typeface="맑은 고딕" charset="0"/>
-            </a:endParaRPr>
-          </a:p>
-        </p:txBody>
-      </p:sp>
-      <p:pic>
-        <p:nvPicPr>
-          <p:cNvPr id="1095" name="그림 8"/>
-          <p:cNvPicPr>
-            <a:picLocks noChangeAspect="1"/>
-          </p:cNvPicPr>
-          <p:nvPr/>
-        </p:nvPicPr>
-        <p:blipFill rotWithShape="1">
-          <a:blip r:embed="rId7" cstate="print">
-            <a:extLst>
-              <a:ext uri="{28A0092B-C50C-407E-A947-70E740481C1C}">
-                <a14:useLocalDpi xmlns:a14="http://schemas.microsoft.com/office/drawing/2010/main" val="0"/>
-              </a:ext>
-            </a:extLst>
-          </a:blip>
-          <a:stretch>
-            <a:fillRect/>
-          </a:stretch>
-        </p:blipFill>
-        <p:spPr>
-          <a:xfrm rot="0">
-            <a:off x="6921500" y="2984500"/>
-            <a:ext cx="4434840" cy="1651000"/>
-          </a:xfrm>
-          <a:prstGeom prst="rect"/>
-          <a:noFill/>
-        </p:spPr>
-      </p:pic>
-      <p:pic>
-        <p:nvPicPr>
-          <p:cNvPr id="1096" name="그림 9"/>
-          <p:cNvPicPr>
-            <a:picLocks noChangeAspect="1"/>
-          </p:cNvPicPr>
-          <p:nvPr/>
-        </p:nvPicPr>
-        <p:blipFill rotWithShape="1">
-          <a:blip r:embed="rId8" cstate="print">
-            <a:extLst>
-              <a:ext uri="{28A0092B-C50C-407E-A947-70E740481C1C}">
-                <a14:useLocalDpi xmlns:a14="http://schemas.microsoft.com/office/drawing/2010/main" val="0"/>
-              </a:ext>
-            </a:extLst>
-          </a:blip>
-          <a:stretch>
-            <a:fillRect/>
-          </a:stretch>
-        </p:blipFill>
-        <p:spPr>
-          <a:xfrm rot="0">
-            <a:off x="3524250" y="2348865"/>
-            <a:ext cx="2075180" cy="2562225"/>
+            <a:off x="6924675" y="2954655"/>
+            <a:ext cx="4206875" cy="1800860"/>
           </a:xfrm>
           <a:prstGeom prst="rect"/>
           <a:noFill/>
@@ -8772,8 +8079,8 @@
         </p:blipFill>
         <p:spPr>
           <a:xfrm rot="0">
-            <a:off x="30480" y="0"/>
-            <a:ext cx="12162155" cy="6863080"/>
+            <a:off x="0" y="0"/>
+            <a:ext cx="12192635" cy="6863080"/>
           </a:xfrm>
           <a:prstGeom prst="rect"/>
           <a:noFill/>
@@ -8789,8 +8096,8 @@
         </p:nvSpPr>
         <p:spPr>
           <a:xfrm rot="0">
-            <a:off x="7926070" y="-1270"/>
-            <a:ext cx="3644900" cy="554990"/>
+            <a:off x="8891905" y="-1270"/>
+            <a:ext cx="1886585" cy="554990"/>
           </a:xfrm>
           <a:prstGeom prst="rect"/>
           <a:noFill/>
@@ -8817,7 +8124,7 @@
                 <a:latin typeface="맑은 고딕" charset="0"/>
                 <a:ea typeface="맑은 고딕" charset="0"/>
               </a:rPr>
-              <a:t>Coordinate System</a:t>
+              <a:t>Inspector</a:t>
             </a:r>
             <a:endParaRPr lang="ko-KR" altLang="en-US" sz="3000" b="1">
               <a:solidFill>
@@ -8840,7 +8147,7 @@
         <p:spPr>
           <a:xfrm rot="0">
             <a:off x="1209675" y="1096645"/>
-            <a:ext cx="4427220" cy="923925"/>
+            <a:ext cx="4420870" cy="647065"/>
           </a:xfrm>
           <a:prstGeom prst="rect"/>
           <a:noFill/>
@@ -8864,30 +8171,13 @@
                 <a:latin typeface="맑은 고딕" charset="0"/>
                 <a:ea typeface="맑은 고딕" charset="0"/>
               </a:rPr>
-              <a:t>유니티 좌표계는 왼손 좌표계를 사용하며 </a:t>
+              <a:t>인스펙터는 게임 오브젝트에 포함되어 있는 컴포넌트의 정보를 나타냅니다.</a:t>
             </a:r>
             <a:endParaRPr lang="ko-KR" altLang="en-US" sz="1800">
               <a:latin typeface="맑은 고딕" charset="0"/>
               <a:ea typeface="맑은 고딕" charset="0"/>
             </a:endParaRPr>
           </a:p>
-          <a:p>
-            <a:pPr marL="0" indent="0" algn="l" latinLnBrk="0" hangingPunct="1">
-              <a:buFontTx/>
-              <a:buNone/>
-            </a:pPr>
-            <a:r>
-              <a:rPr lang="ko-KR" sz="1800">
-                <a:latin typeface="맑은 고딕" charset="0"/>
-                <a:ea typeface="맑은 고딕" charset="0"/>
-              </a:rPr>
-              <a:t>엄지를 x축 방향, 검지를 y축 방향, 중지를 z축 방향으로 표시합니다. </a:t>
-            </a:r>
-            <a:endParaRPr lang="ko-KR" altLang="en-US" sz="1800">
-              <a:latin typeface="맑은 고딕" charset="0"/>
-              <a:ea typeface="맑은 고딕" charset="0"/>
-            </a:endParaRPr>
-          </a:p>
         </p:txBody>
       </p:sp>
       <p:sp>
@@ -8900,8 +8190,8 @@
         </p:nvSpPr>
         <p:spPr>
           <a:xfrm rot="0">
-            <a:off x="1207135" y="4753610"/>
-            <a:ext cx="4429760" cy="923925"/>
+            <a:off x="1272540" y="4935855"/>
+            <a:ext cx="4430395" cy="923925"/>
           </a:xfrm>
           <a:prstGeom prst="rect"/>
           <a:noFill/>
@@ -8925,7 +8215,7 @@
                 <a:latin typeface="맑은 고딕" charset="0"/>
                 <a:ea typeface="맑은 고딕" charset="0"/>
               </a:rPr>
-              <a:t>왼손 좌표계는 화면을 바라보는 사람에게서 화면 방향으로 z축을 가리키게 됩니다.</a:t>
+              <a:t>게임 오브젝트 마다 필요한 컴포넌트가 부착되어 있으며, 컴포넌트를 추가하거나 삭제도 할 수 있습니다.</a:t>
             </a:r>
             <a:endParaRPr lang="ko-KR" altLang="en-US" sz="1800">
               <a:latin typeface="맑은 고딕" charset="0"/>
@@ -8944,8 +8234,8 @@
         </p:nvSpPr>
         <p:spPr>
           <a:xfrm rot="0">
-            <a:off x="6932295" y="4751070"/>
-            <a:ext cx="4199255" cy="923925"/>
+            <a:off x="6883400" y="4657725"/>
+            <a:ext cx="4206875" cy="1200785"/>
           </a:xfrm>
           <a:prstGeom prst="rect"/>
           <a:noFill/>
@@ -8969,7 +8259,7 @@
                 <a:latin typeface="맑은 고딕" charset="0"/>
                 <a:ea typeface="맑은 고딕" charset="0"/>
               </a:rPr>
-              <a:t>오브젝트의 위치를 나타내는 좌표계로, 화면의 중심을 원점으로 (0, 0, 0)로 하는 3차원 좌표계입니다.</a:t>
+              <a:t>게임 오브젝트에 스크립트를 부착하여 원하는 오브젝트를 선택하여 지정할 수 있으며, 이동 속도를 설정하여 조절할 수도 있습니다. </a:t>
             </a:r>
             <a:endParaRPr lang="ko-KR" altLang="en-US" sz="1800">
               <a:latin typeface="맑은 고딕" charset="0"/>
@@ -8980,7 +8270,7 @@
       </p:sp>
       <p:pic>
         <p:nvPicPr>
-          <p:cNvPr id="1097" name="그림 2"/>
+          <p:cNvPr id="1092" name="그림 1"/>
           <p:cNvPicPr>
             <a:picLocks noChangeAspect="1"/>
           </p:cNvPicPr>
@@ -9000,8 +8290,8 @@
         </p:blipFill>
         <p:spPr>
           <a:xfrm rot="0">
-            <a:off x="1234440" y="2295525"/>
-            <a:ext cx="1935480" cy="2240280"/>
+            <a:off x="3051175" y="1943735"/>
+            <a:ext cx="2311400" cy="2776220"/>
           </a:xfrm>
           <a:prstGeom prst="rect"/>
           <a:noFill/>
@@ -9009,17 +8299,17 @@
       </p:pic>
       <p:pic>
         <p:nvPicPr>
-          <p:cNvPr id="1098" name="그림 3" descr="C:/Users/Admin1/AppData/Roaming/PolarisOffice/ETemp/9284_9875952/fImage60681918467.png"/>
+          <p:cNvPr id="1093" name="그림 2"/>
           <p:cNvPicPr>
             <a:picLocks noChangeAspect="1"/>
           </p:cNvPicPr>
           <p:nvPr/>
         </p:nvPicPr>
         <p:blipFill rotWithShape="1">
-          <a:blip r:embed="rId4" cstate="hqprint">
+          <a:blip r:embed="rId4" cstate="print">
             <a:extLst>
               <a:ext uri="{28A0092B-C50C-407E-A947-70E740481C1C}">
-                <a14:useLocalDpi xmlns:a14="http://schemas.microsoft.com/office/drawing/2010/main"/>
+                <a14:useLocalDpi xmlns:a14="http://schemas.microsoft.com/office/drawing/2010/main" val="0"/>
               </a:ext>
             </a:extLst>
           </a:blip>
@@ -9029,18 +8319,16 @@
         </p:blipFill>
         <p:spPr>
           <a:xfrm rot="0">
-            <a:off x="6932930" y="1094105"/>
-            <a:ext cx="4208145" cy="1683385"/>
-          </a:xfrm>
-          <a:prstGeom prst="roundRect"/>
-          <a:solidFill>
-            <a:srgbClr val="EDEDED"/>
-          </a:solidFill>
+            <a:off x="1269365" y="2277745"/>
+            <a:ext cx="1184275" cy="882015"/>
+          </a:xfrm>
+          <a:prstGeom prst="rect"/>
+          <a:noFill/>
         </p:spPr>
       </p:pic>
       <p:pic>
         <p:nvPicPr>
-          <p:cNvPr id="1099" name="그림 4"/>
+          <p:cNvPr id="1094" name="그림 3"/>
           <p:cNvPicPr>
             <a:picLocks noChangeAspect="1"/>
           </p:cNvPicPr>
@@ -9060,16 +8348,18 @@
         </p:blipFill>
         <p:spPr>
           <a:xfrm rot="0">
-            <a:off x="3556000" y="2277110"/>
-            <a:ext cx="2047875" cy="2276475"/>
-          </a:xfrm>
-          <a:prstGeom prst="rect"/>
-          <a:noFill/>
+            <a:off x="1270000" y="3704590"/>
+            <a:ext cx="1182370" cy="636270"/>
+          </a:xfrm>
+          <a:prstGeom prst="roundRect"/>
+          <a:solidFill>
+            <a:srgbClr val="EDEDED"/>
+          </a:solidFill>
         </p:spPr>
       </p:pic>
       <p:pic>
         <p:nvPicPr>
-          <p:cNvPr id="1100" name="그림 5"/>
+          <p:cNvPr id="1096" name="그림 8"/>
           <p:cNvPicPr>
             <a:picLocks noChangeAspect="1"/>
           </p:cNvPicPr>
@@ -9089,8 +8379,8 @@
         </p:blipFill>
         <p:spPr>
           <a:xfrm rot="0">
-            <a:off x="6924675" y="2954655"/>
-            <a:ext cx="4206875" cy="1800860"/>
+            <a:off x="6882765" y="1089025"/>
+            <a:ext cx="4215765" cy="3425825"/>
           </a:xfrm>
           <a:prstGeom prst="rect"/>
           <a:noFill/>
@@ -9159,7 +8449,7 @@
         <p:spPr>
           <a:xfrm rot="0">
             <a:off x="0" y="0"/>
-            <a:ext cx="12192635" cy="6863080"/>
+            <a:ext cx="12193270" cy="6863715"/>
           </a:xfrm>
           <a:prstGeom prst="rect"/>
           <a:noFill/>
@@ -9175,8 +8465,8 @@
         </p:nvSpPr>
         <p:spPr>
           <a:xfrm rot="0">
-            <a:off x="8535670" y="-1270"/>
-            <a:ext cx="2666365" cy="554990"/>
+            <a:off x="8792845" y="-1270"/>
+            <a:ext cx="1948180" cy="554990"/>
           </a:xfrm>
           <a:prstGeom prst="rect"/>
           <a:noFill/>
@@ -9203,7 +8493,7 @@
                 <a:latin typeface="맑은 고딕" charset="0"/>
                 <a:ea typeface="맑은 고딕" charset="0"/>
               </a:rPr>
-              <a:t>Console View</a:t>
+              <a:t>Hierarchy</a:t>
             </a:r>
             <a:endParaRPr lang="ko-KR" altLang="en-US" sz="3000" b="1">
               <a:solidFill>
@@ -9226,7 +8516,7 @@
         <p:spPr>
           <a:xfrm rot="0">
             <a:off x="1209675" y="1096645"/>
-            <a:ext cx="4420235" cy="647065"/>
+            <a:ext cx="4421505" cy="923925"/>
           </a:xfrm>
           <a:prstGeom prst="rect"/>
           <a:noFill/>
@@ -9250,7 +8540,7 @@
                 <a:latin typeface="맑은 고딕" charset="0"/>
                 <a:ea typeface="맑은 고딕" charset="0"/>
               </a:rPr>
-              <a:t>콘솔 뷰는 로그나 에러를 출력하여 정보를 전달하는 뷰입니다.</a:t>
+              <a:t>계층구조는 현재 게임 화면에 배치되어 있는 게임 오브젝트를 표시하고 관리하는 영역입니다.</a:t>
             </a:r>
             <a:endParaRPr lang="ko-KR" altLang="en-US" sz="1800">
               <a:latin typeface="맑은 고딕" charset="0"/>
@@ -9269,8 +8559,8 @@
         </p:nvSpPr>
         <p:spPr>
           <a:xfrm rot="0">
-            <a:off x="1197610" y="3639185"/>
-            <a:ext cx="4429760" cy="2031365"/>
+            <a:off x="1272540" y="4935855"/>
+            <a:ext cx="4431030" cy="923925"/>
           </a:xfrm>
           <a:prstGeom prst="rect"/>
           <a:noFill/>
@@ -9294,84 +8584,13 @@
                 <a:latin typeface="맑은 고딕" charset="0"/>
                 <a:ea typeface="맑은 고딕" charset="0"/>
               </a:rPr>
-              <a:t>Clear : 모든 로그를 삭제합니다.</a:t>
+              <a:t>계층구조의 순서는 알파벳 순서로 정렬되며 게임 오브젝트 안에 게임 오브젝트를 넣을 수도 있습니다.</a:t>
             </a:r>
             <a:endParaRPr lang="ko-KR" altLang="en-US" sz="1800">
               <a:latin typeface="맑은 고딕" charset="0"/>
               <a:ea typeface="맑은 고딕" charset="0"/>
             </a:endParaRPr>
           </a:p>
-          <a:p>
-            <a:pPr marL="0" indent="0" algn="l" latinLnBrk="0" hangingPunct="1">
-              <a:buFontTx/>
-              <a:buNone/>
-            </a:pPr>
-            <a:endParaRPr lang="ko-KR" altLang="en-US" sz="1800">
-              <a:latin typeface="맑은 고딕" charset="0"/>
-              <a:ea typeface="맑은 고딕" charset="0"/>
-            </a:endParaRPr>
-          </a:p>
-          <a:p>
-            <a:pPr marL="0" indent="0" algn="l" latinLnBrk="0" hangingPunct="1">
-              <a:buFontTx/>
-              <a:buNone/>
-            </a:pPr>
-            <a:r>
-              <a:rPr lang="ko-KR" sz="1800">
-                <a:latin typeface="맑은 고딕" charset="0"/>
-                <a:ea typeface="맑은 고딕" charset="0"/>
-              </a:rPr>
-              <a:t>Collapse : 같은 내용의 로그끼리 묶어서</a:t>
-            </a:r>
-            <a:endParaRPr lang="ko-KR" altLang="en-US" sz="1800">
-              <a:latin typeface="맑은 고딕" charset="0"/>
-              <a:ea typeface="맑은 고딕" charset="0"/>
-            </a:endParaRPr>
-          </a:p>
-          <a:p>
-            <a:pPr marL="0" indent="0" algn="l" latinLnBrk="0" hangingPunct="1">
-              <a:buFontTx/>
-              <a:buNone/>
-            </a:pPr>
-            <a:r>
-              <a:rPr lang="ko-KR" sz="1800">
-                <a:latin typeface="맑은 고딕" charset="0"/>
-                <a:ea typeface="맑은 고딕" charset="0"/>
-              </a:rPr>
-              <a:t>출력합니다.</a:t>
-            </a:r>
-            <a:endParaRPr lang="ko-KR" altLang="en-US" sz="1800">
-              <a:latin typeface="맑은 고딕" charset="0"/>
-              <a:ea typeface="맑은 고딕" charset="0"/>
-            </a:endParaRPr>
-          </a:p>
-          <a:p>
-            <a:pPr marL="0" indent="0" algn="l" latinLnBrk="0" hangingPunct="1">
-              <a:buFontTx/>
-              <a:buNone/>
-            </a:pPr>
-            <a:endParaRPr lang="ko-KR" altLang="en-US" sz="1800">
-              <a:latin typeface="맑은 고딕" charset="0"/>
-              <a:ea typeface="맑은 고딕" charset="0"/>
-            </a:endParaRPr>
-          </a:p>
-          <a:p>
-            <a:pPr marL="0" indent="0" algn="l" latinLnBrk="0" hangingPunct="1">
-              <a:buFontTx/>
-              <a:buNone/>
-            </a:pPr>
-            <a:r>
-              <a:rPr lang="ko-KR" sz="1800">
-                <a:latin typeface="맑은 고딕" charset="0"/>
-                <a:ea typeface="맑은 고딕" charset="0"/>
-              </a:rPr>
-              <a:t>Clear on Play : 플레이하기 전에 쌓여있던 모든 로그를 삭제합니다.</a:t>
-            </a:r>
-            <a:endParaRPr lang="ko-KR" altLang="en-US" sz="1800">
-              <a:latin typeface="맑은 고딕" charset="0"/>
-              <a:ea typeface="맑은 고딕" charset="0"/>
-            </a:endParaRPr>
-          </a:p>
         </p:txBody>
       </p:sp>
       <p:sp>
@@ -9384,8 +8603,8 @@
         </p:nvSpPr>
         <p:spPr>
           <a:xfrm rot="0">
-            <a:off x="6913245" y="1141095"/>
-            <a:ext cx="4199255" cy="4523105"/>
+            <a:off x="6873875" y="4105275"/>
+            <a:ext cx="4207510" cy="1754505"/>
           </a:xfrm>
           <a:prstGeom prst="rect"/>
           <a:noFill/>
@@ -9409,7 +8628,7 @@
                 <a:latin typeface="맑은 고딕" charset="0"/>
                 <a:ea typeface="맑은 고딕" charset="0"/>
               </a:rPr>
-              <a:t>Error Pause : 플레이 중 에러가 발생하면 일시 정지합니다.</a:t>
+              <a:t>게임 오브젝트 안에 게임 오브젝트가 들어가게 되면 (상위 오브젝트) - (하위 오브젝트)로 분류됩니다.</a:t>
             </a:r>
             <a:endParaRPr lang="ko-KR" altLang="en-US" sz="1800">
               <a:latin typeface="맑은 고딕" charset="0"/>
@@ -9421,190 +8640,43 @@
               <a:buFontTx/>
               <a:buNone/>
             </a:pPr>
+            <a:r>
+              <a:rPr lang="ko-KR" sz="1800">
+                <a:latin typeface="맑은 고딕" charset="0"/>
+                <a:ea typeface="맑은 고딕" charset="0"/>
+              </a:rPr>
+              <a:t/>
+            </a:r>
+            <a:br>
+              <a:rPr lang="ko-KR" sz="1800">
+                <a:latin typeface="맑은 고딕" charset="0"/>
+                <a:ea typeface="맑은 고딕" charset="0"/>
+              </a:rPr>
+            </a:br>
+            <a:r>
+              <a:rPr lang="ko-KR" sz="1800">
+                <a:latin typeface="맑은 고딕" charset="0"/>
+                <a:ea typeface="맑은 고딕" charset="0"/>
+              </a:rPr>
+              <a:t>하위 오브젝트는 상위 오브젝트의 변화가 생기면 똑같이 영향을 받습니다.</a:t>
+            </a:r>
             <a:endParaRPr lang="ko-KR" altLang="en-US" sz="1800">
               <a:latin typeface="맑은 고딕" charset="0"/>
               <a:ea typeface="맑은 고딕" charset="0"/>
             </a:endParaRPr>
           </a:p>
-          <a:p>
-            <a:pPr marL="0" indent="0" algn="l" latinLnBrk="0" hangingPunct="1">
-              <a:buFontTx/>
-              <a:buNone/>
-            </a:pPr>
-            <a:r>
-              <a:rPr lang="ko-KR" sz="1800">
-                <a:latin typeface="맑은 고딕" charset="0"/>
-                <a:ea typeface="맑은 고딕" charset="0"/>
-              </a:rPr>
-              <a:t>Editor : 유니티 에디터 외부의 기기에서 원격 로그를 받습니다.</a:t>
-            </a:r>
-            <a:endParaRPr lang="ko-KR" altLang="en-US" sz="1800">
-              <a:latin typeface="맑은 고딕" charset="0"/>
-              <a:ea typeface="맑은 고딕" charset="0"/>
-            </a:endParaRPr>
-          </a:p>
-          <a:p>
-            <a:pPr marL="0" indent="0" algn="l" latinLnBrk="0" hangingPunct="1">
-              <a:buFontTx/>
-              <a:buNone/>
-            </a:pPr>
-            <a:endParaRPr lang="ko-KR" altLang="en-US" sz="1800">
-              <a:latin typeface="맑은 고딕" charset="0"/>
-              <a:ea typeface="맑은 고딕" charset="0"/>
-            </a:endParaRPr>
-          </a:p>
-          <a:p>
-            <a:pPr marL="0" indent="0" algn="l" latinLnBrk="0" hangingPunct="1">
-              <a:buFontTx/>
-              <a:buNone/>
-            </a:pPr>
-            <a:r>
-              <a:rPr lang="ko-KR" sz="1800">
-                <a:latin typeface="맑은 고딕" charset="0"/>
-                <a:ea typeface="맑은 고딕" charset="0"/>
-              </a:rPr>
-              <a:t>일반 로그 (회색) : 일반적인 기록 정보를 출력하는 로그입니다.</a:t>
-            </a:r>
-            <a:endParaRPr lang="ko-KR" altLang="en-US" sz="1800">
-              <a:latin typeface="맑은 고딕" charset="0"/>
-              <a:ea typeface="맑은 고딕" charset="0"/>
-            </a:endParaRPr>
-          </a:p>
-          <a:p>
-            <a:pPr marL="0" indent="0" algn="l" latinLnBrk="0" hangingPunct="1">
-              <a:buFontTx/>
-              <a:buNone/>
-            </a:pPr>
-            <a:endParaRPr lang="ko-KR" altLang="en-US" sz="1800">
-              <a:latin typeface="맑은 고딕" charset="0"/>
-              <a:ea typeface="맑은 고딕" charset="0"/>
-            </a:endParaRPr>
-          </a:p>
-          <a:p>
-            <a:pPr marL="0" indent="0" algn="l" latinLnBrk="0" hangingPunct="1">
-              <a:buFontTx/>
-              <a:buNone/>
-            </a:pPr>
-            <a:r>
-              <a:rPr lang="ko-KR" sz="1800">
-                <a:latin typeface="맑은 고딕" charset="0"/>
-                <a:ea typeface="맑은 고딕" charset="0"/>
-              </a:rPr>
-              <a:t>경고 로그 (노란색) : 권장할만한 수정사항, 더 나은 구현 방법, 주의 사항을 표시할 때 발생하는 로그입니다.</a:t>
-            </a:r>
-            <a:endParaRPr lang="ko-KR" altLang="en-US" sz="1800">
-              <a:latin typeface="맑은 고딕" charset="0"/>
-              <a:ea typeface="맑은 고딕" charset="0"/>
-            </a:endParaRPr>
-          </a:p>
-          <a:p>
-            <a:pPr marL="0" indent="0" algn="l" latinLnBrk="0" hangingPunct="1">
-              <a:buFontTx/>
-              <a:buNone/>
-            </a:pPr>
-            <a:endParaRPr lang="ko-KR" altLang="en-US" sz="1800">
-              <a:latin typeface="맑은 고딕" charset="0"/>
-              <a:ea typeface="맑은 고딕" charset="0"/>
-            </a:endParaRPr>
-          </a:p>
-          <a:p>
-            <a:pPr marL="0" indent="0" algn="l" latinLnBrk="0" hangingPunct="1">
-              <a:buFontTx/>
-              <a:buNone/>
-            </a:pPr>
-            <a:r>
-              <a:rPr lang="ko-KR" sz="1800">
-                <a:latin typeface="맑은 고딕" charset="0"/>
-                <a:ea typeface="맑은 고딕" charset="0"/>
-              </a:rPr>
-              <a:t>에러 로그 (빨간색) : 잘못된 문법이나 접근으로 명령을 실행할 수 없는 문제가 생겼을 때 발생하는 로그입니다.</a:t>
-            </a:r>
-            <a:endParaRPr lang="ko-KR" altLang="en-US" sz="1800">
-              <a:latin typeface="맑은 고딕" charset="0"/>
-              <a:ea typeface="맑은 고딕" charset="0"/>
-            </a:endParaRPr>
-          </a:p>
         </p:txBody>
       </p:sp>
       <p:pic>
         <p:nvPicPr>
-          <p:cNvPr id="1101" name="그림 6"/>
+          <p:cNvPr id="1097" name="그림 1" descr="C:/Users/Admin1/AppData/Roaming/PolarisOffice/ETemp/9284_9875952/fImage910422641.png"/>
           <p:cNvPicPr>
             <a:picLocks noChangeAspect="1"/>
           </p:cNvPicPr>
           <p:nvPr/>
         </p:nvPicPr>
         <p:blipFill rotWithShape="1">
-          <a:blip r:embed="rId3" cstate="print">
-            <a:extLst>
-              <a:ext uri="{28A0092B-C50C-407E-A947-70E740481C1C}">
-                <a14:useLocalDpi xmlns:a14="http://schemas.microsoft.com/office/drawing/2010/main" val="0"/>
-              </a:ext>
-            </a:extLst>
-          </a:blip>
-          <a:stretch>
-            <a:fillRect/>
-          </a:stretch>
-        </p:blipFill>
-        <p:spPr>
-          <a:xfrm rot="0">
-            <a:off x="1214120" y="1885950"/>
-            <a:ext cx="4415790" cy="1724660"/>
-          </a:xfrm>
-          <a:prstGeom prst="rect"/>
-          <a:noFill/>
-        </p:spPr>
-      </p:pic>
-    </p:spTree>
-  </p:cSld>
-  <p:clrMapOvr>
-    <a:masterClrMapping/>
-  </p:clrMapOvr>
-  <mc:AlternateContent xmlns:mc="http://schemas.openxmlformats.org/markup-compatibility/2006">
-    <mc:Choice xmlns:p14="http://schemas.microsoft.com/office/powerpoint/2010/main" Requires="p14">
-      <p:transition spd="slow" p14:dur="2000"/>
-    </mc:Choice>
-    <mc:Fallback>
-      <p:transition spd="slow"/>
-    </mc:Fallback>
-  </mc:AlternateContent>
-  <p:timing>
-    <p:tnLst>
-      <p:par>
-        <p:cTn id="1" dur="indefinite" restart="never" nodeType="tmRoot"/>
-      </p:par>
-    </p:tnLst>
-  </p:timing>
-</p:sld>
-</file>
-
-<file path=ppt/slides/slide9.xml><?xml version="1.0" encoding="utf-8"?>
-<p:sld xmlns:a="http://schemas.openxmlformats.org/drawingml/2006/main" xmlns:r="http://schemas.openxmlformats.org/officeDocument/2006/relationships" xmlns:p="http://schemas.openxmlformats.org/presentationml/2006/main" xmlns:p14="http://schemas.microsoft.com/office/powerpoint/2010/main">
-  <p:cSld>
-    <p:spTree>
-      <p:nvGrpSpPr>
-        <p:cNvPr id="1" name=""/>
-        <p:cNvGrpSpPr/>
-        <p:nvPr/>
-      </p:nvGrpSpPr>
-      <p:grpSpPr>
-        <a:xfrm>
-          <a:off x="0" y="0"/>
-          <a:ext cx="0" cy="0"/>
-          <a:chOff x="0" y="0"/>
-          <a:chExt cx="0" cy="0"/>
-        </a:xfrm>
-      </p:grpSpPr>
-      <p:pic>
-        <p:nvPicPr>
-          <p:cNvPr id="1073" name="Picture "/>
-          <p:cNvPicPr>
-            <a:picLocks noChangeAspect="1"/>
-          </p:cNvPicPr>
-          <p:nvPr/>
-        </p:nvPicPr>
-        <p:blipFill rotWithShape="1">
-          <a:blip r:embed="rId2" cstate="hqprint">
+          <a:blip r:embed="rId3" cstate="hqprint">
             <a:extLst>
               <a:ext uri="{28A0092B-C50C-407E-A947-70E740481C1C}">
                 <a14:useLocalDpi xmlns:a14="http://schemas.microsoft.com/office/drawing/2010/main"/>
@@ -9617,100 +8689,63 @@
         </p:blipFill>
         <p:spPr>
           <a:xfrm rot="0">
-            <a:off x="0" y="0"/>
-            <a:ext cx="12192635" cy="6863080"/>
-          </a:xfrm>
-          <a:prstGeom prst="rect"/>
-          <a:noFill/>
+            <a:off x="1214120" y="2171700"/>
+            <a:ext cx="1835150" cy="2696845"/>
+          </a:xfrm>
+          <a:prstGeom prst="roundRect"/>
+          <a:solidFill>
+            <a:srgbClr val="EDEDED"/>
+          </a:solidFill>
         </p:spPr>
       </p:pic>
       <p:sp>
         <p:nvSpPr>
-          <p:cNvPr id="1031" name="Rect 0"/>
-          <p:cNvSpPr txBox="1">
+          <p:cNvPr id="1099" name="도형 3"/>
+          <p:cNvSpPr>
             <a:spLocks/>
           </p:cNvSpPr>
           <p:nvPr/>
         </p:nvSpPr>
         <p:spPr>
           <a:xfrm rot="0">
-            <a:off x="8891905" y="-1270"/>
-            <a:ext cx="1886585" cy="554990"/>
-          </a:xfrm>
-          <a:prstGeom prst="rect"/>
-          <a:noFill/>
-          <a:ln w="0">
-            <a:noFill/>
-            <a:prstDash/>
-          </a:ln>
-        </p:spPr>
-        <p:txBody>
-          <a:bodyPr wrap="square" lIns="89535" tIns="46355" rIns="89535" bIns="46355" numCol="1" vert="horz" anchor="t">
-            <a:spAutoFit/>
-          </a:bodyPr>
-          <a:lstStyle/>
-          <a:p>
-            <a:pPr marL="0" indent="0" algn="ctr" latinLnBrk="0">
-              <a:buFontTx/>
-              <a:buNone/>
-            </a:pPr>
-            <a:r>
-              <a:rPr lang="ko-KR" altLang="en-US" sz="3000" b="1">
-                <a:solidFill>
-                  <a:schemeClr val="tx1"/>
-                </a:solidFill>
-                <a:latin typeface="맑은 고딕" charset="0"/>
-                <a:ea typeface="맑은 고딕" charset="0"/>
-              </a:rPr>
-              <a:t>Inspector</a:t>
-            </a:r>
-            <a:endParaRPr lang="ko-KR" altLang="en-US" sz="3000" b="1">
-              <a:solidFill>
-                <a:schemeClr val="tx1"/>
-              </a:solidFill>
-              <a:latin typeface="맑은 고딕" charset="0"/>
-              <a:ea typeface="맑은 고딕" charset="0"/>
-            </a:endParaRPr>
-          </a:p>
-        </p:txBody>
-      </p:sp>
-      <p:sp>
-        <p:nvSpPr>
-          <p:cNvPr id="1035" name="Rect 0"/>
-          <p:cNvSpPr txBox="1">
-            <a:spLocks/>
-          </p:cNvSpPr>
-          <p:nvPr/>
-        </p:nvSpPr>
-        <p:spPr>
-          <a:xfrm rot="0">
-            <a:off x="1209675" y="1096645"/>
-            <a:ext cx="4420870" cy="647065"/>
-          </a:xfrm>
-          <a:prstGeom prst="rect"/>
-          <a:noFill/>
-          <a:ln w="0">
-            <a:noFill/>
-            <a:prstDash/>
-          </a:ln>
-        </p:spPr>
-        <p:txBody>
-          <a:bodyPr wrap="square" lIns="89535" tIns="46355" rIns="89535" bIns="46355" numCol="1" vert="horz" anchor="t">
-            <a:spAutoFit/>
-          </a:bodyPr>
-          <a:lstStyle/>
-          <a:p>
-            <a:pPr marL="0" indent="0" algn="l" latinLnBrk="0" hangingPunct="1">
-              <a:buFontTx/>
-              <a:buNone/>
-            </a:pPr>
-            <a:r>
-              <a:rPr lang="ko-KR" sz="1800">
-                <a:latin typeface="맑은 고딕" charset="0"/>
-                <a:ea typeface="맑은 고딕" charset="0"/>
-              </a:rPr>
-              <a:t>인스펙터는 게임 오브젝트에 포함되어 있는 컴포넌트의 정보를 나타냅니다.</a:t>
-            </a:r>
+            <a:off x="3238500" y="3371850"/>
+            <a:ext cx="362585" cy="191135"/>
+          </a:xfrm>
+          <a:prstGeom prst="notchedRightArrow"/>
+          <a:scene3d>
+            <a:camera prst="orthographicFront"/>
+            <a:lightRig rig="threePt" dir="t"/>
+          </a:scene3d>
+          <a:sp3d prstMaterial="warmMatte">
+            <a:bevelT w="76200" h="76200" prst="circle"/>
+            <a:contourClr>
+              <a:srgbClr val="000000"/>
+            </a:contourClr>
+          </a:sp3d>
+        </p:spPr>
+        <p:style>
+          <a:lnRef idx="2">
+            <a:schemeClr val="accent1">
+              <a:shade val="50000"/>
+            </a:schemeClr>
+          </a:lnRef>
+          <a:fillRef idx="1">
+            <a:schemeClr val="accent1"/>
+          </a:fillRef>
+          <a:effectRef idx="0">
+            <a:schemeClr val="accent1"/>
+          </a:effectRef>
+          <a:fontRef idx="minor">
+            <a:schemeClr val="lt1"/>
+          </a:fontRef>
+        </p:style>
+        <p:txBody>
+          <a:bodyPr wrap="square" lIns="91440" tIns="45720" rIns="91440" bIns="45720" vert="horz" anchor="ctr">
+            <a:noAutofit/>
+          </a:bodyPr>
+          <a:lstStyle/>
+          <a:p>
+            <a:pPr marL="0" indent="0" algn="ctr" hangingPunct="1"/>
             <a:endParaRPr lang="ko-KR" altLang="en-US" sz="1800">
               <a:latin typeface="맑은 고딕" charset="0"/>
               <a:ea typeface="맑은 고딕" charset="0"/>
@@ -9718,107 +8753,19 @@
           </a:p>
         </p:txBody>
       </p:sp>
-      <p:sp>
-        <p:nvSpPr>
-          <p:cNvPr id="1045" name="Rect 0"/>
-          <p:cNvSpPr txBox="1">
-            <a:spLocks/>
-          </p:cNvSpPr>
-          <p:nvPr/>
-        </p:nvSpPr>
-        <p:spPr>
-          <a:xfrm rot="0">
-            <a:off x="1272540" y="4935855"/>
-            <a:ext cx="4430395" cy="923925"/>
-          </a:xfrm>
-          <a:prstGeom prst="rect"/>
-          <a:noFill/>
-          <a:ln w="0">
-            <a:noFill/>
-            <a:prstDash/>
-          </a:ln>
-        </p:spPr>
-        <p:txBody>
-          <a:bodyPr wrap="square" lIns="89535" tIns="46355" rIns="89535" bIns="46355" numCol="1" vert="horz" anchor="t">
-            <a:spAutoFit/>
-          </a:bodyPr>
-          <a:lstStyle/>
-          <a:p>
-            <a:pPr marL="0" indent="0" algn="l" latinLnBrk="0" hangingPunct="1">
-              <a:buFontTx/>
-              <a:buNone/>
-            </a:pPr>
-            <a:r>
-              <a:rPr lang="ko-KR" sz="1800">
-                <a:latin typeface="맑은 고딕" charset="0"/>
-                <a:ea typeface="맑은 고딕" charset="0"/>
-              </a:rPr>
-              <a:t>게임 오브젝트 마다 필요한 컴포넌트가 부착되어 있으며, 컴포넌트를 추가하거나 삭제도 할 수 있습니다.</a:t>
-            </a:r>
-            <a:endParaRPr lang="ko-KR" altLang="en-US" sz="1800">
-              <a:latin typeface="맑은 고딕" charset="0"/>
-              <a:ea typeface="맑은 고딕" charset="0"/>
-            </a:endParaRPr>
-          </a:p>
-        </p:txBody>
-      </p:sp>
-      <p:sp>
-        <p:nvSpPr>
-          <p:cNvPr id="1091" name="Rect 0"/>
-          <p:cNvSpPr txBox="1">
-            <a:spLocks/>
-          </p:cNvSpPr>
-          <p:nvPr/>
-        </p:nvSpPr>
-        <p:spPr>
-          <a:xfrm rot="0">
-            <a:off x="6883400" y="4657725"/>
-            <a:ext cx="4206875" cy="1200785"/>
-          </a:xfrm>
-          <a:prstGeom prst="rect"/>
-          <a:noFill/>
-          <a:ln w="0">
-            <a:noFill/>
-            <a:prstDash/>
-          </a:ln>
-        </p:spPr>
-        <p:txBody>
-          <a:bodyPr wrap="square" lIns="89535" tIns="46355" rIns="89535" bIns="46355" numCol="1" vert="horz" anchor="t">
-            <a:spAutoFit/>
-          </a:bodyPr>
-          <a:lstStyle/>
-          <a:p>
-            <a:pPr marL="0" indent="0" algn="l" latinLnBrk="0" hangingPunct="1">
-              <a:buFontTx/>
-              <a:buNone/>
-            </a:pPr>
-            <a:r>
-              <a:rPr lang="ko-KR" sz="1800">
-                <a:latin typeface="맑은 고딕" charset="0"/>
-                <a:ea typeface="맑은 고딕" charset="0"/>
-              </a:rPr>
-              <a:t>게임 오브젝트에 스크립트를 부착하여 원하는 오브젝트를 선택하여 지정할 수 있으며, 이동 속도를 설정하여 조절할 수도 있습니다. </a:t>
-            </a:r>
-            <a:endParaRPr lang="ko-KR" altLang="en-US" sz="1800">
-              <a:latin typeface="맑은 고딕" charset="0"/>
-              <a:ea typeface="맑은 고딕" charset="0"/>
-            </a:endParaRPr>
-          </a:p>
-        </p:txBody>
-      </p:sp>
       <p:pic>
         <p:nvPicPr>
-          <p:cNvPr id="1092" name="그림 1"/>
+          <p:cNvPr id="1100" name="그림 5" descr="C:/Users/Admin1/AppData/Roaming/PolarisOffice/ETemp/9284_9875952/fImage2054942298467.png"/>
           <p:cNvPicPr>
             <a:picLocks noChangeAspect="1"/>
           </p:cNvPicPr>
           <p:nvPr/>
         </p:nvPicPr>
         <p:blipFill rotWithShape="1">
-          <a:blip r:embed="rId3" cstate="print">
+          <a:blip r:embed="rId4" cstate="hqprint">
             <a:extLst>
               <a:ext uri="{28A0092B-C50C-407E-A947-70E740481C1C}">
-                <a14:useLocalDpi xmlns:a14="http://schemas.microsoft.com/office/drawing/2010/main" val="0"/>
+                <a14:useLocalDpi xmlns:a14="http://schemas.microsoft.com/office/drawing/2010/main"/>
               </a:ext>
             </a:extLst>
           </a:blip>
@@ -9828,26 +8775,28 @@
         </p:blipFill>
         <p:spPr>
           <a:xfrm rot="0">
-            <a:off x="3051175" y="1943735"/>
-            <a:ext cx="2311400" cy="2776220"/>
-          </a:xfrm>
-          <a:prstGeom prst="rect"/>
-          <a:noFill/>
+            <a:off x="3800475" y="2171700"/>
+            <a:ext cx="1820545" cy="2706370"/>
+          </a:xfrm>
+          <a:prstGeom prst="roundRect"/>
+          <a:solidFill>
+            <a:srgbClr val="EDEDED"/>
+          </a:solidFill>
         </p:spPr>
       </p:pic>
       <p:pic>
         <p:nvPicPr>
-          <p:cNvPr id="1093" name="그림 2"/>
+          <p:cNvPr id="1101" name="그림 6" descr="C:/Users/Admin1/AppData/Roaming/PolarisOffice/ETemp/9284_9875952/fImage134002306334.png"/>
           <p:cNvPicPr>
             <a:picLocks noChangeAspect="1"/>
           </p:cNvPicPr>
           <p:nvPr/>
         </p:nvPicPr>
         <p:blipFill rotWithShape="1">
-          <a:blip r:embed="rId4" cstate="print">
+          <a:blip r:embed="rId5" cstate="hqprint">
             <a:extLst>
               <a:ext uri="{28A0092B-C50C-407E-A947-70E740481C1C}">
-                <a14:useLocalDpi xmlns:a14="http://schemas.microsoft.com/office/drawing/2010/main" val="0"/>
+                <a14:useLocalDpi xmlns:a14="http://schemas.microsoft.com/office/drawing/2010/main"/>
               </a:ext>
             </a:extLst>
           </a:blip>
@@ -9857,26 +8806,28 @@
         </p:blipFill>
         <p:spPr>
           <a:xfrm rot="0">
-            <a:off x="1269365" y="2277745"/>
-            <a:ext cx="1184275" cy="882015"/>
-          </a:xfrm>
-          <a:prstGeom prst="rect"/>
-          <a:noFill/>
+            <a:off x="6886575" y="1099820"/>
+            <a:ext cx="2277745" cy="2921000"/>
+          </a:xfrm>
+          <a:prstGeom prst="roundRect"/>
+          <a:solidFill>
+            <a:srgbClr val="EDEDED"/>
+          </a:solidFill>
         </p:spPr>
       </p:pic>
       <p:pic>
         <p:nvPicPr>
-          <p:cNvPr id="1094" name="그림 3"/>
+          <p:cNvPr id="1102" name="그림 8" descr="C:/Users/Admin1/AppData/Roaming/PolarisOffice/ETemp/9284_9875952/fImage20212336500.png"/>
           <p:cNvPicPr>
             <a:picLocks noChangeAspect="1"/>
           </p:cNvPicPr>
           <p:nvPr/>
         </p:nvPicPr>
         <p:blipFill rotWithShape="1">
-          <a:blip r:embed="rId5" cstate="print">
+          <a:blip r:embed="rId6" cstate="hqprint">
             <a:extLst>
               <a:ext uri="{28A0092B-C50C-407E-A947-70E740481C1C}">
-                <a14:useLocalDpi xmlns:a14="http://schemas.microsoft.com/office/drawing/2010/main" val="0"/>
+                <a14:useLocalDpi xmlns:a14="http://schemas.microsoft.com/office/drawing/2010/main"/>
               </a:ext>
             </a:extLst>
           </a:blip>
@@ -9886,39 +8837,8 @@
         </p:blipFill>
         <p:spPr>
           <a:xfrm rot="0">
-            <a:off x="1270000" y="3704590"/>
-            <a:ext cx="1182370" cy="636270"/>
-          </a:xfrm>
-          <a:prstGeom prst="roundRect"/>
-          <a:solidFill>
-            <a:srgbClr val="EDEDED"/>
-          </a:solidFill>
-        </p:spPr>
-      </p:pic>
-      <p:pic>
-        <p:nvPicPr>
-          <p:cNvPr id="1096" name="그림 8"/>
-          <p:cNvPicPr>
-            <a:picLocks noChangeAspect="1"/>
-          </p:cNvPicPr>
-          <p:nvPr/>
-        </p:nvPicPr>
-        <p:blipFill rotWithShape="1">
-          <a:blip r:embed="rId6" cstate="print">
-            <a:extLst>
-              <a:ext uri="{28A0092B-C50C-407E-A947-70E740481C1C}">
-                <a14:useLocalDpi xmlns:a14="http://schemas.microsoft.com/office/drawing/2010/main" val="0"/>
-              </a:ext>
-            </a:extLst>
-          </a:blip>
-          <a:stretch>
-            <a:fillRect/>
-          </a:stretch>
-        </p:blipFill>
-        <p:spPr>
-          <a:xfrm rot="0">
-            <a:off x="6882765" y="1089025"/>
-            <a:ext cx="4215765" cy="3425825"/>
+            <a:off x="9372600" y="1557020"/>
+            <a:ext cx="1696720" cy="2144395"/>
           </a:xfrm>
           <a:prstGeom prst="rect"/>
           <a:noFill/>

</xml_diff>